<commit_message>
added ml modeling in practice
</commit_message>
<xml_diff>
--- a/08 - ML Modeling in Practice/Model Selection and Recap.pptx
+++ b/08 - ML Modeling in Practice/Model Selection and Recap.pptx
@@ -6,54 +6,53 @@
     <p:sldMasterId id="2147483672" r:id="rId2"/>
   </p:sldMasterIdLst>
   <p:notesMasterIdLst>
-    <p:notesMasterId r:id="rId48"/>
+    <p:notesMasterId r:id="rId47"/>
   </p:notesMasterIdLst>
   <p:sldIdLst>
     <p:sldId id="256" r:id="rId3"/>
-    <p:sldId id="497" r:id="rId4"/>
-    <p:sldId id="498" r:id="rId5"/>
-    <p:sldId id="318" r:id="rId6"/>
-    <p:sldId id="323" r:id="rId7"/>
-    <p:sldId id="287" r:id="rId8"/>
-    <p:sldId id="284" r:id="rId9"/>
-    <p:sldId id="474" r:id="rId10"/>
-    <p:sldId id="475" r:id="rId11"/>
-    <p:sldId id="476" r:id="rId12"/>
-    <p:sldId id="477" r:id="rId13"/>
-    <p:sldId id="478" r:id="rId14"/>
-    <p:sldId id="486" r:id="rId15"/>
-    <p:sldId id="484" r:id="rId16"/>
-    <p:sldId id="488" r:id="rId17"/>
-    <p:sldId id="489" r:id="rId18"/>
-    <p:sldId id="490" r:id="rId19"/>
-    <p:sldId id="491" r:id="rId20"/>
-    <p:sldId id="492" r:id="rId21"/>
-    <p:sldId id="493" r:id="rId22"/>
-    <p:sldId id="494" r:id="rId23"/>
-    <p:sldId id="495" r:id="rId24"/>
-    <p:sldId id="487" r:id="rId25"/>
-    <p:sldId id="485" r:id="rId26"/>
-    <p:sldId id="496" r:id="rId27"/>
-    <p:sldId id="473" r:id="rId28"/>
-    <p:sldId id="479" r:id="rId29"/>
-    <p:sldId id="481" r:id="rId30"/>
-    <p:sldId id="480" r:id="rId31"/>
-    <p:sldId id="482" r:id="rId32"/>
-    <p:sldId id="501" r:id="rId33"/>
-    <p:sldId id="263" r:id="rId34"/>
-    <p:sldId id="296" r:id="rId35"/>
-    <p:sldId id="260" r:id="rId36"/>
-    <p:sldId id="502" r:id="rId37"/>
-    <p:sldId id="431" r:id="rId38"/>
-    <p:sldId id="309" r:id="rId39"/>
-    <p:sldId id="325" r:id="rId40"/>
-    <p:sldId id="457" r:id="rId41"/>
-    <p:sldId id="428" r:id="rId42"/>
-    <p:sldId id="297" r:id="rId43"/>
-    <p:sldId id="503" r:id="rId44"/>
-    <p:sldId id="454" r:id="rId45"/>
-    <p:sldId id="472" r:id="rId46"/>
-    <p:sldId id="500" r:id="rId47"/>
+    <p:sldId id="498" r:id="rId4"/>
+    <p:sldId id="318" r:id="rId5"/>
+    <p:sldId id="323" r:id="rId6"/>
+    <p:sldId id="287" r:id="rId7"/>
+    <p:sldId id="284" r:id="rId8"/>
+    <p:sldId id="474" r:id="rId9"/>
+    <p:sldId id="475" r:id="rId10"/>
+    <p:sldId id="476" r:id="rId11"/>
+    <p:sldId id="477" r:id="rId12"/>
+    <p:sldId id="478" r:id="rId13"/>
+    <p:sldId id="486" r:id="rId14"/>
+    <p:sldId id="484" r:id="rId15"/>
+    <p:sldId id="488" r:id="rId16"/>
+    <p:sldId id="489" r:id="rId17"/>
+    <p:sldId id="490" r:id="rId18"/>
+    <p:sldId id="491" r:id="rId19"/>
+    <p:sldId id="492" r:id="rId20"/>
+    <p:sldId id="493" r:id="rId21"/>
+    <p:sldId id="494" r:id="rId22"/>
+    <p:sldId id="495" r:id="rId23"/>
+    <p:sldId id="487" r:id="rId24"/>
+    <p:sldId id="485" r:id="rId25"/>
+    <p:sldId id="496" r:id="rId26"/>
+    <p:sldId id="473" r:id="rId27"/>
+    <p:sldId id="479" r:id="rId28"/>
+    <p:sldId id="481" r:id="rId29"/>
+    <p:sldId id="480" r:id="rId30"/>
+    <p:sldId id="482" r:id="rId31"/>
+    <p:sldId id="501" r:id="rId32"/>
+    <p:sldId id="263" r:id="rId33"/>
+    <p:sldId id="296" r:id="rId34"/>
+    <p:sldId id="260" r:id="rId35"/>
+    <p:sldId id="502" r:id="rId36"/>
+    <p:sldId id="431" r:id="rId37"/>
+    <p:sldId id="309" r:id="rId38"/>
+    <p:sldId id="325" r:id="rId39"/>
+    <p:sldId id="457" r:id="rId40"/>
+    <p:sldId id="428" r:id="rId41"/>
+    <p:sldId id="297" r:id="rId42"/>
+    <p:sldId id="503" r:id="rId43"/>
+    <p:sldId id="454" r:id="rId44"/>
+    <p:sldId id="472" r:id="rId45"/>
+    <p:sldId id="500" r:id="rId46"/>
   </p:sldIdLst>
   <p:sldSz cx="12192000" cy="6858000"/>
   <p:notesSz cx="6858000" cy="9144000"/>
@@ -291,7 +290,7 @@
       <p15:sldGuideLst xmlns:p15="http://schemas.microsoft.com/office/powerpoint/2012/main"/>
     </p:ext>
     <p:ext uri="http://customooxmlschemas.google.com/">
-      <go:slidesCustomData xmlns="" xmlns:mc="http://schemas.openxmlformats.org/markup-compatibility/2006" xmlns:mv="urn:schemas-microsoft-com:mac:vml" xmlns:c="http://schemas.openxmlformats.org/drawingml/2006/chart" xmlns:dgm="http://schemas.openxmlformats.org/drawingml/2006/diagram" xmlns:o="urn:schemas-microsoft-com:office:office" xmlns:v="urn:schemas-microsoft-com:vml" xmlns:pvml="urn:schemas-microsoft-com:office:powerpoint" xmlns:com="http://schemas.openxmlformats.org/drawingml/2006/compatibility" xmlns:p14="http://schemas.microsoft.com/office/powerpoint/2010/main" xmlns:p15="http://schemas.microsoft.com/office/powerpoint/2012/main" xmlns:go="http://customooxmlschemas.google.com/" r:id="rId54" roundtripDataSignature="AMtx7mjFyVUGRZWio+dc9dxzYsimUxNJbg=="/>
+      <go:slidesCustomData xmlns:go="http://customooxmlschemas.google.com/" xmlns:p15="http://schemas.microsoft.com/office/powerpoint/2012/main" xmlns:p14="http://schemas.microsoft.com/office/powerpoint/2010/main" xmlns:com="http://schemas.openxmlformats.org/drawingml/2006/compatibility" xmlns:pvml="urn:schemas-microsoft-com:office:powerpoint" xmlns:v="urn:schemas-microsoft-com:vml" xmlns:o="urn:schemas-microsoft-com:office:office" xmlns:dgm="http://schemas.openxmlformats.org/drawingml/2006/diagram" xmlns:c="http://schemas.openxmlformats.org/drawingml/2006/chart" xmlns:mv="urn:schemas-microsoft-com:mac:vml" xmlns:mc="http://schemas.openxmlformats.org/markup-compatibility/2006" xmlns="" r:id="rId54" roundtripDataSignature="AMtx7mjFyVUGRZWio+dc9dxzYsimUxNJbg=="/>
     </p:ext>
   </p:extLst>
 </p:presentation>
@@ -8276,7 +8275,7 @@
           <a:p>
             <a:fld id="{87916DAE-669F-3546-9A68-DB1260F5EB98}" type="slidenum">
               <a:rPr lang="en-US" smtClean="0"/>
-              <a:t>37</a:t>
+              <a:t>36</a:t>
             </a:fld>
             <a:endParaRPr lang="en-US"/>
           </a:p>
@@ -9659,7 +9658,7 @@
           <a:p>
             <a:fld id="{7C0312F8-2DE2-6B40-83C5-731724CAE2B0}" type="datetimeFigureOut">
               <a:rPr lang="en-US" smtClean="0"/>
-              <a:t>10/19/20</a:t>
+              <a:t>10/17/21</a:t>
             </a:fld>
             <a:endParaRPr lang="en-US"/>
           </a:p>
@@ -9944,7 +9943,7 @@
           <a:p>
             <a:fld id="{7C0312F8-2DE2-6B40-83C5-731724CAE2B0}" type="datetimeFigureOut">
               <a:rPr lang="en-US" smtClean="0"/>
-              <a:t>10/19/20</a:t>
+              <a:t>10/17/21</a:t>
             </a:fld>
             <a:endParaRPr lang="en-US"/>
           </a:p>
@@ -10363,7 +10362,7 @@
           <a:p>
             <a:fld id="{7C0312F8-2DE2-6B40-83C5-731724CAE2B0}" type="datetimeFigureOut">
               <a:rPr lang="en-US" smtClean="0"/>
-              <a:t>10/19/20</a:t>
+              <a:t>10/17/21</a:t>
             </a:fld>
             <a:endParaRPr lang="en-US"/>
           </a:p>
@@ -10458,7 +10457,7 @@
           <a:p>
             <a:fld id="{7C0312F8-2DE2-6B40-83C5-731724CAE2B0}" type="datetimeFigureOut">
               <a:rPr lang="en-US" smtClean="0"/>
-              <a:t>10/19/20</a:t>
+              <a:t>10/17/21</a:t>
             </a:fld>
             <a:endParaRPr lang="en-US"/>
           </a:p>
@@ -14292,7 +14291,7 @@
           <a:p>
             <a:fld id="{7C0312F8-2DE2-6B40-83C5-731724CAE2B0}" type="datetimeFigureOut">
               <a:rPr lang="en-US" smtClean="0"/>
-              <a:t>10/19/20</a:t>
+              <a:t>10/17/21</a:t>
             </a:fld>
             <a:endParaRPr lang="en-US"/>
           </a:p>
@@ -14848,98 +14847,6 @@
   <p:cSld>
     <p:spTree>
       <p:nvGrpSpPr>
-        <p:cNvPr id="1" name="Shape 442"/>
-        <p:cNvGrpSpPr/>
-        <p:nvPr/>
-      </p:nvGrpSpPr>
-      <p:grpSpPr>
-        <a:xfrm>
-          <a:off x="0" y="0"/>
-          <a:ext cx="0" cy="0"/>
-          <a:chOff x="0" y="0"/>
-          <a:chExt cx="0" cy="0"/>
-        </a:xfrm>
-      </p:grpSpPr>
-      <p:sp>
-        <p:nvSpPr>
-          <p:cNvPr id="443" name="Google Shape;443;p41"/>
-          <p:cNvSpPr txBox="1">
-            <a:spLocks noGrp="1"/>
-          </p:cNvSpPr>
-          <p:nvPr>
-            <p:ph type="title"/>
-          </p:nvPr>
-        </p:nvSpPr>
-        <p:spPr>
-          <a:prstGeom prst="rect">
-            <a:avLst/>
-          </a:prstGeom>
-        </p:spPr>
-        <p:txBody>
-          <a:bodyPr spcFirstLastPara="1" wrap="square" lIns="121900" tIns="60933" rIns="121900" bIns="60933" anchor="ctr" anchorCtr="0">
-            <a:noAutofit/>
-          </a:bodyPr>
-          <a:lstStyle/>
-          <a:p>
-            <a:r>
-              <a:rPr lang="en" dirty="0"/>
-              <a:t>Model Selection</a:t>
-            </a:r>
-            <a:endParaRPr sz="4000" b="1" dirty="0">
-              <a:latin typeface="Roboto"/>
-              <a:ea typeface="Roboto"/>
-              <a:cs typeface="Roboto"/>
-              <a:sym typeface="Roboto"/>
-            </a:endParaRPr>
-          </a:p>
-        </p:txBody>
-      </p:sp>
-      <p:pic>
-        <p:nvPicPr>
-          <p:cNvPr id="444" name="Google Shape;444;p41" title="Chart"/>
-          <p:cNvPicPr preferRelativeResize="0"/>
-          <p:nvPr/>
-        </p:nvPicPr>
-        <p:blipFill>
-          <a:blip r:embed="rId3">
-            <a:alphaModFix/>
-          </a:blip>
-          <a:stretch>
-            <a:fillRect/>
-          </a:stretch>
-        </p:blipFill>
-        <p:spPr>
-          <a:xfrm>
-            <a:off x="2101685" y="1174400"/>
-            <a:ext cx="7988633" cy="5118800"/>
-          </a:xfrm>
-          <a:prstGeom prst="rect">
-            <a:avLst/>
-          </a:prstGeom>
-          <a:noFill/>
-          <a:ln>
-            <a:noFill/>
-          </a:ln>
-        </p:spPr>
-      </p:pic>
-    </p:spTree>
-    <p:extLst>
-      <p:ext uri="{BB962C8B-B14F-4D97-AF65-F5344CB8AC3E}">
-        <p14:creationId xmlns:p14="http://schemas.microsoft.com/office/powerpoint/2010/main" val="809143300"/>
-      </p:ext>
-    </p:extLst>
-  </p:cSld>
-  <p:clrMapOvr>
-    <a:masterClrMapping/>
-  </p:clrMapOvr>
-</p:sld>
-</file>
-
-<file path=ppt/slides/slide11.xml><?xml version="1.0" encoding="utf-8"?>
-<p:sld xmlns:a="http://schemas.openxmlformats.org/drawingml/2006/main" xmlns:r="http://schemas.openxmlformats.org/officeDocument/2006/relationships" xmlns:p="http://schemas.openxmlformats.org/presentationml/2006/main">
-  <p:cSld>
-    <p:spTree>
-      <p:nvGrpSpPr>
         <p:cNvPr id="1" name="Shape 448"/>
         <p:cNvGrpSpPr/>
         <p:nvPr/>
@@ -15018,6 +14925,185 @@
     <p:extLst>
       <p:ext uri="{BB962C8B-B14F-4D97-AF65-F5344CB8AC3E}">
         <p14:creationId xmlns:p14="http://schemas.microsoft.com/office/powerpoint/2010/main" val="2714202845"/>
+      </p:ext>
+    </p:extLst>
+  </p:cSld>
+  <p:clrMapOvr>
+    <a:masterClrMapping/>
+  </p:clrMapOvr>
+</p:sld>
+</file>
+
+<file path=ppt/slides/slide11.xml><?xml version="1.0" encoding="utf-8"?>
+<p:sld xmlns:a="http://schemas.openxmlformats.org/drawingml/2006/main" xmlns:r="http://schemas.openxmlformats.org/officeDocument/2006/relationships" xmlns:p="http://schemas.openxmlformats.org/presentationml/2006/main">
+  <p:cSld>
+    <p:spTree>
+      <p:nvGrpSpPr>
+        <p:cNvPr id="1" name="Shape 454"/>
+        <p:cNvGrpSpPr/>
+        <p:nvPr/>
+      </p:nvGrpSpPr>
+      <p:grpSpPr>
+        <a:xfrm>
+          <a:off x="0" y="0"/>
+          <a:ext cx="0" cy="0"/>
+          <a:chOff x="0" y="0"/>
+          <a:chExt cx="0" cy="0"/>
+        </a:xfrm>
+      </p:grpSpPr>
+      <p:sp>
+        <p:nvSpPr>
+          <p:cNvPr id="455" name="Google Shape;455;p43"/>
+          <p:cNvSpPr txBox="1">
+            <a:spLocks noGrp="1"/>
+          </p:cNvSpPr>
+          <p:nvPr>
+            <p:ph type="title"/>
+          </p:nvPr>
+        </p:nvSpPr>
+        <p:spPr>
+          <a:prstGeom prst="rect">
+            <a:avLst/>
+          </a:prstGeom>
+        </p:spPr>
+        <p:txBody>
+          <a:bodyPr spcFirstLastPara="1" wrap="square" lIns="121900" tIns="60933" rIns="121900" bIns="60933" anchor="ctr" anchorCtr="0">
+            <a:noAutofit/>
+          </a:bodyPr>
+          <a:lstStyle/>
+          <a:p>
+            <a:r>
+              <a:rPr lang="en" dirty="0"/>
+              <a:t>Model Selection</a:t>
+            </a:r>
+            <a:endParaRPr sz="4000" b="1" dirty="0">
+              <a:latin typeface="Roboto"/>
+              <a:ea typeface="Roboto"/>
+              <a:cs typeface="Roboto"/>
+              <a:sym typeface="Roboto"/>
+            </a:endParaRPr>
+          </a:p>
+        </p:txBody>
+      </p:sp>
+      <p:sp>
+        <p:nvSpPr>
+          <p:cNvPr id="456" name="Google Shape;456;p43"/>
+          <p:cNvSpPr txBox="1">
+            <a:spLocks noGrp="1"/>
+          </p:cNvSpPr>
+          <p:nvPr>
+            <p:ph type="body" idx="1"/>
+          </p:nvPr>
+        </p:nvSpPr>
+        <p:spPr>
+          <a:xfrm>
+            <a:off x="415600" y="1536632"/>
+            <a:ext cx="11360700" cy="4787967"/>
+          </a:xfrm>
+          <a:prstGeom prst="rect">
+            <a:avLst/>
+          </a:prstGeom>
+        </p:spPr>
+        <p:txBody>
+          <a:bodyPr spcFirstLastPara="1" wrap="square" lIns="121900" tIns="60933" rIns="121900" bIns="60933" anchor="t" anchorCtr="0">
+            <a:noAutofit/>
+          </a:bodyPr>
+          <a:lstStyle/>
+          <a:p>
+            <a:pPr indent="-474121">
+              <a:buSzPts val="2000"/>
+            </a:pPr>
+            <a:r>
+              <a:rPr lang="en" sz="2667" dirty="0"/>
+              <a:t>How can you narrow hundreds or thousands of model specifications down to a handful of the best-performing ones?</a:t>
+            </a:r>
+            <a:br>
+              <a:rPr lang="en" sz="2667" dirty="0"/>
+            </a:br>
+            <a:endParaRPr sz="2667" dirty="0"/>
+          </a:p>
+          <a:p>
+            <a:pPr indent="-474121">
+              <a:spcBef>
+                <a:spcPts val="0"/>
+              </a:spcBef>
+              <a:buSzPts val="2000"/>
+            </a:pPr>
+            <a:r>
+              <a:rPr lang="en" sz="2667" dirty="0"/>
+              <a:t>How do you balance performance and stability?</a:t>
+            </a:r>
+            <a:endParaRPr sz="2667" dirty="0"/>
+          </a:p>
+          <a:p>
+            <a:pPr lvl="1" indent="-474121">
+              <a:spcBef>
+                <a:spcPts val="0"/>
+              </a:spcBef>
+              <a:buSzPts val="2000"/>
+            </a:pPr>
+            <a:r>
+              <a:rPr lang="en" sz="2667" dirty="0"/>
+              <a:t>mean performance?</a:t>
+            </a:r>
+            <a:endParaRPr sz="2667" dirty="0"/>
+          </a:p>
+          <a:p>
+            <a:pPr lvl="1" indent="-474121">
+              <a:spcBef>
+                <a:spcPts val="0"/>
+              </a:spcBef>
+              <a:buSzPts val="2000"/>
+            </a:pPr>
+            <a:r>
+              <a:rPr lang="en" sz="2667" dirty="0"/>
+              <a:t>balancing mean and variance?</a:t>
+            </a:r>
+            <a:endParaRPr sz="2667" dirty="0"/>
+          </a:p>
+          <a:p>
+            <a:pPr lvl="1" indent="-474121">
+              <a:spcBef>
+                <a:spcPts val="0"/>
+              </a:spcBef>
+              <a:buSzPts val="2000"/>
+            </a:pPr>
+            <a:r>
+              <a:rPr lang="en" sz="2667" dirty="0"/>
+              <a:t>recency-weighted mean?</a:t>
+            </a:r>
+            <a:br>
+              <a:rPr lang="en" sz="2667" dirty="0"/>
+            </a:br>
+            <a:endParaRPr sz="2667" dirty="0"/>
+          </a:p>
+          <a:p>
+            <a:pPr indent="-474121">
+              <a:spcBef>
+                <a:spcPts val="0"/>
+              </a:spcBef>
+              <a:buSzPts val="2000"/>
+            </a:pPr>
+            <a:r>
+              <a:rPr lang="en" sz="2667" dirty="0"/>
+              <a:t>W</a:t>
+            </a:r>
+            <a:r>
+              <a:rPr lang="en-US" sz="2667" dirty="0"/>
+              <a:t>h</a:t>
+            </a:r>
+            <a:r>
+              <a:rPr lang="en" sz="2667" dirty="0"/>
+              <a:t>at is the “regret” in subsequent time periods from using different strategies for choosing a model to deploy?</a:t>
+            </a:r>
+            <a:endParaRPr sz="2667" dirty="0"/>
+          </a:p>
+        </p:txBody>
+      </p:sp>
+    </p:spTree>
+    <p:extLst>
+      <p:ext uri="{BB962C8B-B14F-4D97-AF65-F5344CB8AC3E}">
+        <p14:creationId xmlns:p14="http://schemas.microsoft.com/office/powerpoint/2010/main" val="1094637480"/>
       </p:ext>
     </p:extLst>
   </p:cSld>
@@ -15103,185 +15189,6 @@
           </a:bodyPr>
           <a:lstStyle/>
           <a:p>
-            <a:pPr indent="-474121">
-              <a:buSzPts val="2000"/>
-            </a:pPr>
-            <a:r>
-              <a:rPr lang="en" sz="2667" dirty="0"/>
-              <a:t>How can you narrow hundreds or thousands of model specifications down to a handful of the best-performing ones?</a:t>
-            </a:r>
-            <a:br>
-              <a:rPr lang="en" sz="2667" dirty="0"/>
-            </a:br>
-            <a:endParaRPr sz="2667" dirty="0"/>
-          </a:p>
-          <a:p>
-            <a:pPr indent="-474121">
-              <a:spcBef>
-                <a:spcPts val="0"/>
-              </a:spcBef>
-              <a:buSzPts val="2000"/>
-            </a:pPr>
-            <a:r>
-              <a:rPr lang="en" sz="2667" dirty="0"/>
-              <a:t>How do you balance performance and stability?</a:t>
-            </a:r>
-            <a:endParaRPr sz="2667" dirty="0"/>
-          </a:p>
-          <a:p>
-            <a:pPr lvl="1" indent="-474121">
-              <a:spcBef>
-                <a:spcPts val="0"/>
-              </a:spcBef>
-              <a:buSzPts val="2000"/>
-            </a:pPr>
-            <a:r>
-              <a:rPr lang="en" sz="2667" dirty="0"/>
-              <a:t>mean performance?</a:t>
-            </a:r>
-            <a:endParaRPr sz="2667" dirty="0"/>
-          </a:p>
-          <a:p>
-            <a:pPr lvl="1" indent="-474121">
-              <a:spcBef>
-                <a:spcPts val="0"/>
-              </a:spcBef>
-              <a:buSzPts val="2000"/>
-            </a:pPr>
-            <a:r>
-              <a:rPr lang="en" sz="2667" dirty="0"/>
-              <a:t>balancing mean and variance?</a:t>
-            </a:r>
-            <a:endParaRPr sz="2667" dirty="0"/>
-          </a:p>
-          <a:p>
-            <a:pPr lvl="1" indent="-474121">
-              <a:spcBef>
-                <a:spcPts val="0"/>
-              </a:spcBef>
-              <a:buSzPts val="2000"/>
-            </a:pPr>
-            <a:r>
-              <a:rPr lang="en" sz="2667" dirty="0"/>
-              <a:t>recency-weighted mean?</a:t>
-            </a:r>
-            <a:br>
-              <a:rPr lang="en" sz="2667" dirty="0"/>
-            </a:br>
-            <a:endParaRPr sz="2667" dirty="0"/>
-          </a:p>
-          <a:p>
-            <a:pPr indent="-474121">
-              <a:spcBef>
-                <a:spcPts val="0"/>
-              </a:spcBef>
-              <a:buSzPts val="2000"/>
-            </a:pPr>
-            <a:r>
-              <a:rPr lang="en" sz="2667" dirty="0"/>
-              <a:t>W</a:t>
-            </a:r>
-            <a:r>
-              <a:rPr lang="en-US" sz="2667" dirty="0"/>
-              <a:t>h</a:t>
-            </a:r>
-            <a:r>
-              <a:rPr lang="en" sz="2667" dirty="0"/>
-              <a:t>at is the “regret” in subsequent time periods from using different strategies for choosing a model to deploy?</a:t>
-            </a:r>
-            <a:endParaRPr sz="2667" dirty="0"/>
-          </a:p>
-        </p:txBody>
-      </p:sp>
-    </p:spTree>
-    <p:extLst>
-      <p:ext uri="{BB962C8B-B14F-4D97-AF65-F5344CB8AC3E}">
-        <p14:creationId xmlns:p14="http://schemas.microsoft.com/office/powerpoint/2010/main" val="1094637480"/>
-      </p:ext>
-    </p:extLst>
-  </p:cSld>
-  <p:clrMapOvr>
-    <a:masterClrMapping/>
-  </p:clrMapOvr>
-</p:sld>
-</file>
-
-<file path=ppt/slides/slide13.xml><?xml version="1.0" encoding="utf-8"?>
-<p:sld xmlns:a="http://schemas.openxmlformats.org/drawingml/2006/main" xmlns:r="http://schemas.openxmlformats.org/officeDocument/2006/relationships" xmlns:p="http://schemas.openxmlformats.org/presentationml/2006/main">
-  <p:cSld>
-    <p:spTree>
-      <p:nvGrpSpPr>
-        <p:cNvPr id="1" name="Shape 454"/>
-        <p:cNvGrpSpPr/>
-        <p:nvPr/>
-      </p:nvGrpSpPr>
-      <p:grpSpPr>
-        <a:xfrm>
-          <a:off x="0" y="0"/>
-          <a:ext cx="0" cy="0"/>
-          <a:chOff x="0" y="0"/>
-          <a:chExt cx="0" cy="0"/>
-        </a:xfrm>
-      </p:grpSpPr>
-      <p:sp>
-        <p:nvSpPr>
-          <p:cNvPr id="455" name="Google Shape;455;p43"/>
-          <p:cNvSpPr txBox="1">
-            <a:spLocks noGrp="1"/>
-          </p:cNvSpPr>
-          <p:nvPr>
-            <p:ph type="title"/>
-          </p:nvPr>
-        </p:nvSpPr>
-        <p:spPr>
-          <a:prstGeom prst="rect">
-            <a:avLst/>
-          </a:prstGeom>
-        </p:spPr>
-        <p:txBody>
-          <a:bodyPr spcFirstLastPara="1" wrap="square" lIns="121900" tIns="60933" rIns="121900" bIns="60933" anchor="ctr" anchorCtr="0">
-            <a:noAutofit/>
-          </a:bodyPr>
-          <a:lstStyle/>
-          <a:p>
-            <a:r>
-              <a:rPr lang="en" dirty="0"/>
-              <a:t>Model Selection</a:t>
-            </a:r>
-            <a:endParaRPr sz="4000" b="1" dirty="0">
-              <a:latin typeface="Roboto"/>
-              <a:ea typeface="Roboto"/>
-              <a:cs typeface="Roboto"/>
-              <a:sym typeface="Roboto"/>
-            </a:endParaRPr>
-          </a:p>
-        </p:txBody>
-      </p:sp>
-      <p:sp>
-        <p:nvSpPr>
-          <p:cNvPr id="456" name="Google Shape;456;p43"/>
-          <p:cNvSpPr txBox="1">
-            <a:spLocks noGrp="1"/>
-          </p:cNvSpPr>
-          <p:nvPr>
-            <p:ph type="body" idx="1"/>
-          </p:nvPr>
-        </p:nvSpPr>
-        <p:spPr>
-          <a:xfrm>
-            <a:off x="415600" y="1536632"/>
-            <a:ext cx="11360700" cy="4787967"/>
-          </a:xfrm>
-          <a:prstGeom prst="rect">
-            <a:avLst/>
-          </a:prstGeom>
-        </p:spPr>
-        <p:txBody>
-          <a:bodyPr spcFirstLastPara="1" wrap="square" lIns="121900" tIns="60933" rIns="121900" bIns="60933" anchor="t" anchorCtr="0">
-            <a:noAutofit/>
-          </a:bodyPr>
-          <a:lstStyle/>
-          <a:p>
             <a:pPr marL="0" indent="0">
               <a:buSzPts val="2000"/>
               <a:buNone/>
@@ -15354,7 +15261,7 @@
 </p:sld>
 </file>
 
-<file path=ppt/slides/slide14.xml><?xml version="1.0" encoding="utf-8"?>
+<file path=ppt/slides/slide13.xml><?xml version="1.0" encoding="utf-8"?>
 <p:sld xmlns:a="http://schemas.openxmlformats.org/drawingml/2006/main" xmlns:r="http://schemas.openxmlformats.org/officeDocument/2006/relationships" xmlns:p="http://schemas.openxmlformats.org/presentationml/2006/main">
   <p:cSld>
     <p:spTree>
@@ -15556,7 +15463,7 @@
 </p:sld>
 </file>
 
-<file path=ppt/slides/slide15.xml><?xml version="1.0" encoding="utf-8"?>
+<file path=ppt/slides/slide14.xml><?xml version="1.0" encoding="utf-8"?>
 <p:sld xmlns:a="http://schemas.openxmlformats.org/drawingml/2006/main" xmlns:r="http://schemas.openxmlformats.org/officeDocument/2006/relationships" xmlns:p="http://schemas.openxmlformats.org/presentationml/2006/main">
   <p:cSld>
     <p:spTree>
@@ -15775,7 +15682,7 @@
 </p:sld>
 </file>
 
-<file path=ppt/slides/slide16.xml><?xml version="1.0" encoding="utf-8"?>
+<file path=ppt/slides/slide15.xml><?xml version="1.0" encoding="utf-8"?>
 <p:sld xmlns:a="http://schemas.openxmlformats.org/drawingml/2006/main" xmlns:r="http://schemas.openxmlformats.org/officeDocument/2006/relationships" xmlns:p="http://schemas.openxmlformats.org/presentationml/2006/main">
   <p:cSld>
     <p:spTree>
@@ -16235,7 +16142,7 @@
 </p:sld>
 </file>
 
-<file path=ppt/slides/slide17.xml><?xml version="1.0" encoding="utf-8"?>
+<file path=ppt/slides/slide16.xml><?xml version="1.0" encoding="utf-8"?>
 <p:sld xmlns:a="http://schemas.openxmlformats.org/drawingml/2006/main" xmlns:r="http://schemas.openxmlformats.org/officeDocument/2006/relationships" xmlns:p="http://schemas.openxmlformats.org/presentationml/2006/main">
   <p:cSld>
     <p:spTree>
@@ -16501,7 +16408,7 @@
 </p:sld>
 </file>
 
-<file path=ppt/slides/slide18.xml><?xml version="1.0" encoding="utf-8"?>
+<file path=ppt/slides/slide17.xml><?xml version="1.0" encoding="utf-8"?>
 <p:sld xmlns:a="http://schemas.openxmlformats.org/drawingml/2006/main" xmlns:r="http://schemas.openxmlformats.org/officeDocument/2006/relationships" xmlns:p="http://schemas.openxmlformats.org/presentationml/2006/main">
   <p:cSld>
     <p:spTree>
@@ -16812,7 +16719,7 @@
 </p:sld>
 </file>
 
-<file path=ppt/slides/slide19.xml><?xml version="1.0" encoding="utf-8"?>
+<file path=ppt/slides/slide18.xml><?xml version="1.0" encoding="utf-8"?>
 <p:sld xmlns:a="http://schemas.openxmlformats.org/drawingml/2006/main" xmlns:r="http://schemas.openxmlformats.org/officeDocument/2006/relationships" xmlns:p="http://schemas.openxmlformats.org/presentationml/2006/main">
   <p:cSld>
     <p:spTree>
@@ -17140,73 +17047,7 @@
 </p:sld>
 </file>
 
-<file path=ppt/slides/slide2.xml><?xml version="1.0" encoding="utf-8"?>
-<p:sld xmlns:a="http://schemas.openxmlformats.org/drawingml/2006/main" xmlns:r="http://schemas.openxmlformats.org/officeDocument/2006/relationships" xmlns:p="http://schemas.openxmlformats.org/presentationml/2006/main" show="0">
-  <p:cSld>
-    <p:spTree>
-      <p:nvGrpSpPr>
-        <p:cNvPr id="1" name=""/>
-        <p:cNvGrpSpPr/>
-        <p:nvPr/>
-      </p:nvGrpSpPr>
-      <p:grpSpPr>
-        <a:xfrm>
-          <a:off x="0" y="0"/>
-          <a:ext cx="0" cy="0"/>
-          <a:chOff x="0" y="0"/>
-          <a:chExt cx="0" cy="0"/>
-        </a:xfrm>
-      </p:grpSpPr>
-      <p:sp>
-        <p:nvSpPr>
-          <p:cNvPr id="4" name="Text Placeholder 3">
-            <a:extLst>
-              <a:ext uri="{FF2B5EF4-FFF2-40B4-BE49-F238E27FC236}">
-                <a16:creationId xmlns:a16="http://schemas.microsoft.com/office/drawing/2014/main" id="{5E600BA7-FA45-884F-9820-9E5F2CB7AA48}"/>
-              </a:ext>
-            </a:extLst>
-          </p:cNvPr>
-          <p:cNvSpPr>
-            <a:spLocks noGrp="1"/>
-          </p:cNvSpPr>
-          <p:nvPr>
-            <p:ph type="body" idx="4294967295"/>
-          </p:nvPr>
-        </p:nvSpPr>
-        <p:spPr>
-          <a:xfrm>
-            <a:off x="0" y="2724150"/>
-            <a:ext cx="11360150" cy="1409700"/>
-          </a:xfrm>
-        </p:spPr>
-        <p:txBody>
-          <a:bodyPr/>
-          <a:lstStyle/>
-          <a:p>
-            <a:pPr marL="76200" indent="0" algn="ctr">
-              <a:buNone/>
-            </a:pPr>
-            <a:r>
-              <a:rPr lang="en-US" sz="4800" dirty="0"/>
-              <a:t>Short Quiz</a:t>
-            </a:r>
-          </a:p>
-        </p:txBody>
-      </p:sp>
-    </p:spTree>
-    <p:extLst>
-      <p:ext uri="{BB962C8B-B14F-4D97-AF65-F5344CB8AC3E}">
-        <p14:creationId xmlns:p14="http://schemas.microsoft.com/office/powerpoint/2010/main" val="16011483"/>
-      </p:ext>
-    </p:extLst>
-  </p:cSld>
-  <p:clrMapOvr>
-    <a:masterClrMapping/>
-  </p:clrMapOvr>
-</p:sld>
-</file>
-
-<file path=ppt/slides/slide20.xml><?xml version="1.0" encoding="utf-8"?>
+<file path=ppt/slides/slide19.xml><?xml version="1.0" encoding="utf-8"?>
 <p:sld xmlns:a="http://schemas.openxmlformats.org/drawingml/2006/main" xmlns:r="http://schemas.openxmlformats.org/officeDocument/2006/relationships" xmlns:p="http://schemas.openxmlformats.org/presentationml/2006/main">
   <p:cSld>
     <p:spTree>
@@ -17531,7 +17372,118 @@
 </p:sld>
 </file>
 
-<file path=ppt/slides/slide21.xml><?xml version="1.0" encoding="utf-8"?>
+<file path=ppt/slides/slide2.xml><?xml version="1.0" encoding="utf-8"?>
+<p:sld xmlns:a="http://schemas.openxmlformats.org/drawingml/2006/main" xmlns:r="http://schemas.openxmlformats.org/officeDocument/2006/relationships" xmlns:p="http://schemas.openxmlformats.org/presentationml/2006/main">
+  <p:cSld>
+    <p:spTree>
+      <p:nvGrpSpPr>
+        <p:cNvPr id="1" name=""/>
+        <p:cNvGrpSpPr/>
+        <p:nvPr/>
+      </p:nvGrpSpPr>
+      <p:grpSpPr>
+        <a:xfrm>
+          <a:off x="0" y="0"/>
+          <a:ext cx="0" cy="0"/>
+          <a:chOff x="0" y="0"/>
+          <a:chExt cx="0" cy="0"/>
+        </a:xfrm>
+      </p:grpSpPr>
+      <p:sp>
+        <p:nvSpPr>
+          <p:cNvPr id="3" name="Title 2">
+            <a:extLst>
+              <a:ext uri="{FF2B5EF4-FFF2-40B4-BE49-F238E27FC236}">
+                <a16:creationId xmlns:a16="http://schemas.microsoft.com/office/drawing/2014/main" id="{9323871C-7CA8-1448-8FFC-1AE6E1838941}"/>
+              </a:ext>
+            </a:extLst>
+          </p:cNvPr>
+          <p:cNvSpPr>
+            <a:spLocks noGrp="1"/>
+          </p:cNvSpPr>
+          <p:nvPr>
+            <p:ph type="title"/>
+          </p:nvPr>
+        </p:nvSpPr>
+        <p:spPr/>
+        <p:txBody>
+          <a:bodyPr/>
+          <a:lstStyle/>
+          <a:p>
+            <a:r>
+              <a:rPr lang="en-US" dirty="0"/>
+              <a:t>Reminders</a:t>
+            </a:r>
+          </a:p>
+        </p:txBody>
+      </p:sp>
+      <p:sp>
+        <p:nvSpPr>
+          <p:cNvPr id="5" name="Text Placeholder 4">
+            <a:extLst>
+              <a:ext uri="{FF2B5EF4-FFF2-40B4-BE49-F238E27FC236}">
+                <a16:creationId xmlns:a16="http://schemas.microsoft.com/office/drawing/2014/main" id="{F4E0A5F0-1D89-954D-91FB-596CD9E690F2}"/>
+              </a:ext>
+            </a:extLst>
+          </p:cNvPr>
+          <p:cNvSpPr>
+            <a:spLocks noGrp="1"/>
+          </p:cNvSpPr>
+          <p:nvPr>
+            <p:ph type="body" idx="1"/>
+          </p:nvPr>
+        </p:nvSpPr>
+        <p:spPr/>
+        <p:txBody>
+          <a:bodyPr/>
+          <a:lstStyle/>
+          <a:p>
+            <a:pPr marL="76200" indent="0">
+              <a:buNone/>
+            </a:pPr>
+            <a:r>
+              <a:rPr lang="en-US" b="1" dirty="0"/>
+              <a:t>This week:</a:t>
+            </a:r>
+            <a:endParaRPr lang="en-US" dirty="0"/>
+          </a:p>
+          <a:p>
+            <a:pPr marL="76200" indent="0">
+              <a:buNone/>
+            </a:pPr>
+            <a:endParaRPr lang="en-US" dirty="0"/>
+          </a:p>
+          <a:p>
+            <a:pPr marL="76200" indent="0">
+              <a:buNone/>
+            </a:pPr>
+            <a:r>
+              <a:rPr lang="en-US" b="1" dirty="0"/>
+              <a:t>Coming up next week:</a:t>
+            </a:r>
+          </a:p>
+          <a:p>
+            <a:pPr marL="76200" indent="0">
+              <a:buNone/>
+            </a:pPr>
+            <a:endParaRPr lang="en-US" b="1" dirty="0"/>
+          </a:p>
+        </p:txBody>
+      </p:sp>
+    </p:spTree>
+    <p:extLst>
+      <p:ext uri="{BB962C8B-B14F-4D97-AF65-F5344CB8AC3E}">
+        <p14:creationId xmlns:p14="http://schemas.microsoft.com/office/powerpoint/2010/main" val="1533227703"/>
+      </p:ext>
+    </p:extLst>
+  </p:cSld>
+  <p:clrMapOvr>
+    <a:masterClrMapping/>
+  </p:clrMapOvr>
+</p:sld>
+</file>
+
+<file path=ppt/slides/slide20.xml><?xml version="1.0" encoding="utf-8"?>
 <p:sld xmlns:a="http://schemas.openxmlformats.org/drawingml/2006/main" xmlns:r="http://schemas.openxmlformats.org/officeDocument/2006/relationships" xmlns:p="http://schemas.openxmlformats.org/presentationml/2006/main">
   <p:cSld>
     <p:spTree>
@@ -18017,7 +17969,7 @@
 </p:sld>
 </file>
 
-<file path=ppt/slides/slide22.xml><?xml version="1.0" encoding="utf-8"?>
+<file path=ppt/slides/slide21.xml><?xml version="1.0" encoding="utf-8"?>
 <p:sld xmlns:a="http://schemas.openxmlformats.org/drawingml/2006/main" xmlns:r="http://schemas.openxmlformats.org/officeDocument/2006/relationships" xmlns:p="http://schemas.openxmlformats.org/presentationml/2006/main">
   <p:cSld>
     <p:spTree>
@@ -18549,7 +18501,7 @@
 </p:sld>
 </file>
 
-<file path=ppt/slides/slide23.xml><?xml version="1.0" encoding="utf-8"?>
+<file path=ppt/slides/slide22.xml><?xml version="1.0" encoding="utf-8"?>
 <p:sld xmlns:a="http://schemas.openxmlformats.org/drawingml/2006/main" xmlns:r="http://schemas.openxmlformats.org/officeDocument/2006/relationships" xmlns:p="http://schemas.openxmlformats.org/presentationml/2006/main">
   <p:cSld>
     <p:spTree>
@@ -18643,7 +18595,7 @@
 </p:sld>
 </file>
 
-<file path=ppt/slides/slide24.xml><?xml version="1.0" encoding="utf-8"?>
+<file path=ppt/slides/slide23.xml><?xml version="1.0" encoding="utf-8"?>
 <p:sld xmlns:a="http://schemas.openxmlformats.org/drawingml/2006/main" xmlns:r="http://schemas.openxmlformats.org/officeDocument/2006/relationships" xmlns:p="http://schemas.openxmlformats.org/presentationml/2006/main">
   <p:cSld>
     <p:spTree>
@@ -18737,7 +18689,7 @@
 </p:sld>
 </file>
 
-<file path=ppt/slides/slide25.xml><?xml version="1.0" encoding="utf-8"?>
+<file path=ppt/slides/slide24.xml><?xml version="1.0" encoding="utf-8"?>
 <p:sld xmlns:a="http://schemas.openxmlformats.org/drawingml/2006/main" xmlns:r="http://schemas.openxmlformats.org/officeDocument/2006/relationships" xmlns:p="http://schemas.openxmlformats.org/presentationml/2006/main">
   <p:cSld>
     <p:spTree>
@@ -18899,6 +18851,127 @@
 </p:sld>
 </file>
 
+<file path=ppt/slides/slide25.xml><?xml version="1.0" encoding="utf-8"?>
+<p:sld xmlns:a="http://schemas.openxmlformats.org/drawingml/2006/main" xmlns:r="http://schemas.openxmlformats.org/officeDocument/2006/relationships" xmlns:p="http://schemas.openxmlformats.org/presentationml/2006/main">
+  <p:cSld>
+    <p:spTree>
+      <p:nvGrpSpPr>
+        <p:cNvPr id="1" name=""/>
+        <p:cNvGrpSpPr/>
+        <p:nvPr/>
+      </p:nvGrpSpPr>
+      <p:grpSpPr>
+        <a:xfrm>
+          <a:off x="0" y="0"/>
+          <a:ext cx="0" cy="0"/>
+          <a:chOff x="0" y="0"/>
+          <a:chExt cx="0" cy="0"/>
+        </a:xfrm>
+      </p:grpSpPr>
+      <p:sp>
+        <p:nvSpPr>
+          <p:cNvPr id="3" name="Title 2">
+            <a:extLst>
+              <a:ext uri="{FF2B5EF4-FFF2-40B4-BE49-F238E27FC236}">
+                <a16:creationId xmlns:a16="http://schemas.microsoft.com/office/drawing/2014/main" id="{9323871C-7CA8-1448-8FFC-1AE6E1838941}"/>
+              </a:ext>
+            </a:extLst>
+          </p:cNvPr>
+          <p:cNvSpPr>
+            <a:spLocks noGrp="1"/>
+          </p:cNvSpPr>
+          <p:nvPr>
+            <p:ph type="title"/>
+          </p:nvPr>
+        </p:nvSpPr>
+        <p:spPr/>
+        <p:txBody>
+          <a:bodyPr/>
+          <a:lstStyle/>
+          <a:p>
+            <a:r>
+              <a:rPr lang="en-US" dirty="0"/>
+              <a:t>Some Open Research Questions</a:t>
+            </a:r>
+          </a:p>
+        </p:txBody>
+      </p:sp>
+      <p:sp>
+        <p:nvSpPr>
+          <p:cNvPr id="4" name="Text Placeholder 3">
+            <a:extLst>
+              <a:ext uri="{FF2B5EF4-FFF2-40B4-BE49-F238E27FC236}">
+                <a16:creationId xmlns:a16="http://schemas.microsoft.com/office/drawing/2014/main" id="{5E600BA7-FA45-884F-9820-9E5F2CB7AA48}"/>
+              </a:ext>
+            </a:extLst>
+          </p:cNvPr>
+          <p:cNvSpPr>
+            <a:spLocks noGrp="1"/>
+          </p:cNvSpPr>
+          <p:nvPr>
+            <p:ph type="body" idx="1"/>
+          </p:nvPr>
+        </p:nvSpPr>
+        <p:spPr/>
+        <p:txBody>
+          <a:bodyPr/>
+          <a:lstStyle/>
+          <a:p>
+            <a:r>
+              <a:rPr lang="en-US" dirty="0"/>
+              <a:t>What are the conditions under which temporal validation out-performs traditional cross-validation? By how much?</a:t>
+            </a:r>
+            <a:br>
+              <a:rPr lang="en-US" dirty="0"/>
+            </a:br>
+            <a:endParaRPr lang="en-US" dirty="0"/>
+          </a:p>
+          <a:p>
+            <a:r>
+              <a:rPr lang="en-US" dirty="0"/>
+              <a:t>Likewise, what can we learn about how well certain strategies perform in terms of regret under different real-world conditions?</a:t>
+            </a:r>
+            <a:br>
+              <a:rPr lang="en-US" dirty="0"/>
+            </a:br>
+            <a:endParaRPr lang="en-US" dirty="0"/>
+          </a:p>
+          <a:p>
+            <a:r>
+              <a:rPr lang="en-US" dirty="0"/>
+              <a:t>Many problems in policy settings involve resource constraints that require optimization at the top of the list, but few methods optimize for this directly.</a:t>
+            </a:r>
+          </a:p>
+          <a:p>
+            <a:pPr lvl="1"/>
+            <a:r>
+              <a:rPr lang="en-US" dirty="0"/>
+              <a:t>e.g., </a:t>
+            </a:r>
+            <a:r>
+              <a:rPr lang="en-US" dirty="0" err="1"/>
+              <a:t>Transductive</a:t>
+            </a:r>
+            <a:r>
+              <a:rPr lang="en-US" dirty="0"/>
+              <a:t> Top k</a:t>
+            </a:r>
+          </a:p>
+        </p:txBody>
+      </p:sp>
+    </p:spTree>
+    <p:extLst>
+      <p:ext uri="{BB962C8B-B14F-4D97-AF65-F5344CB8AC3E}">
+        <p14:creationId xmlns:p14="http://schemas.microsoft.com/office/powerpoint/2010/main" val="136932352"/>
+      </p:ext>
+    </p:extLst>
+  </p:cSld>
+  <p:clrMapOvr>
+    <a:masterClrMapping/>
+  </p:clrMapOvr>
+</p:sld>
+</file>
+
 <file path=ppt/slides/slide26.xml><?xml version="1.0" encoding="utf-8"?>
 <p:sld xmlns:a="http://schemas.openxmlformats.org/drawingml/2006/main" xmlns:r="http://schemas.openxmlformats.org/officeDocument/2006/relationships" xmlns:p="http://schemas.openxmlformats.org/presentationml/2006/main">
   <p:cSld>
@@ -18944,73 +19017,40 @@
           </a:p>
         </p:txBody>
       </p:sp>
-      <p:sp>
-        <p:nvSpPr>
-          <p:cNvPr id="4" name="Text Placeholder 3">
+      <p:pic>
+        <p:nvPicPr>
+          <p:cNvPr id="6" name="Picture 5">
             <a:extLst>
               <a:ext uri="{FF2B5EF4-FFF2-40B4-BE49-F238E27FC236}">
-                <a16:creationId xmlns:a16="http://schemas.microsoft.com/office/drawing/2014/main" id="{5E600BA7-FA45-884F-9820-9E5F2CB7AA48}"/>
+                <a16:creationId xmlns:a16="http://schemas.microsoft.com/office/drawing/2014/main" id="{4B9B5C17-6333-3542-BF92-961541BDC881}"/>
               </a:ext>
             </a:extLst>
           </p:cNvPr>
-          <p:cNvSpPr>
-            <a:spLocks noGrp="1"/>
-          </p:cNvSpPr>
-          <p:nvPr>
-            <p:ph type="body" idx="1"/>
-          </p:nvPr>
-        </p:nvSpPr>
-        <p:spPr/>
-        <p:txBody>
-          <a:bodyPr/>
-          <a:lstStyle/>
-          <a:p>
-            <a:r>
-              <a:rPr lang="en-US" dirty="0"/>
-              <a:t>What are the conditions under which temporal validation out-performs traditional cross-validation? By how much?</a:t>
-            </a:r>
-            <a:br>
-              <a:rPr lang="en-US" dirty="0"/>
-            </a:br>
-            <a:endParaRPr lang="en-US" dirty="0"/>
-          </a:p>
-          <a:p>
-            <a:r>
-              <a:rPr lang="en-US" dirty="0"/>
-              <a:t>Likewise, what can we learn about how well certain strategies perform in terms of regret under different real-world conditions?</a:t>
-            </a:r>
-            <a:br>
-              <a:rPr lang="en-US" dirty="0"/>
-            </a:br>
-            <a:endParaRPr lang="en-US" dirty="0"/>
-          </a:p>
-          <a:p>
-            <a:r>
-              <a:rPr lang="en-US" dirty="0"/>
-              <a:t>Many problems in policy settings involve resource constraints that require optimization at the top of the list, but few methods optimize for this directly.</a:t>
-            </a:r>
-          </a:p>
-          <a:p>
-            <a:pPr lvl="1"/>
-            <a:r>
-              <a:rPr lang="en-US" dirty="0"/>
-              <a:t>e.g., </a:t>
-            </a:r>
-            <a:r>
-              <a:rPr lang="en-US" dirty="0" err="1"/>
-              <a:t>Transductive</a:t>
-            </a:r>
-            <a:r>
-              <a:rPr lang="en-US" dirty="0"/>
-              <a:t> Top k</a:t>
-            </a:r>
-          </a:p>
-        </p:txBody>
-      </p:sp>
+          <p:cNvPicPr>
+            <a:picLocks noChangeAspect="1"/>
+          </p:cNvPicPr>
+          <p:nvPr/>
+        </p:nvPicPr>
+        <p:blipFill>
+          <a:blip r:embed="rId2"/>
+          <a:stretch>
+            <a:fillRect/>
+          </a:stretch>
+        </p:blipFill>
+        <p:spPr>
+          <a:xfrm>
+            <a:off x="1169439" y="1257300"/>
+            <a:ext cx="9853121" cy="5023746"/>
+          </a:xfrm>
+          <a:prstGeom prst="rect">
+            <a:avLst/>
+          </a:prstGeom>
+        </p:spPr>
+      </p:pic>
     </p:spTree>
     <p:extLst>
       <p:ext uri="{BB962C8B-B14F-4D97-AF65-F5344CB8AC3E}">
-        <p14:creationId xmlns:p14="http://schemas.microsoft.com/office/powerpoint/2010/main" val="136932352"/>
+        <p14:creationId xmlns:p14="http://schemas.microsoft.com/office/powerpoint/2010/main" val="1478637945"/>
       </p:ext>
     </p:extLst>
   </p:cSld>
@@ -19065,40 +19105,102 @@
           </a:p>
         </p:txBody>
       </p:sp>
-      <p:pic>
-        <p:nvPicPr>
-          <p:cNvPr id="6" name="Picture 5">
+      <p:sp>
+        <p:nvSpPr>
+          <p:cNvPr id="4" name="Text Placeholder 3">
             <a:extLst>
               <a:ext uri="{FF2B5EF4-FFF2-40B4-BE49-F238E27FC236}">
-                <a16:creationId xmlns:a16="http://schemas.microsoft.com/office/drawing/2014/main" id="{4B9B5C17-6333-3542-BF92-961541BDC881}"/>
+                <a16:creationId xmlns:a16="http://schemas.microsoft.com/office/drawing/2014/main" id="{5E600BA7-FA45-884F-9820-9E5F2CB7AA48}"/>
               </a:ext>
             </a:extLst>
           </p:cNvPr>
-          <p:cNvPicPr>
-            <a:picLocks noChangeAspect="1"/>
-          </p:cNvPicPr>
-          <p:nvPr/>
-        </p:nvPicPr>
-        <p:blipFill>
-          <a:blip r:embed="rId2"/>
-          <a:stretch>
-            <a:fillRect/>
-          </a:stretch>
-        </p:blipFill>
-        <p:spPr>
-          <a:xfrm>
-            <a:off x="1169439" y="1257300"/>
-            <a:ext cx="9853121" cy="5023746"/>
-          </a:xfrm>
-          <a:prstGeom prst="rect">
-            <a:avLst/>
-          </a:prstGeom>
-        </p:spPr>
-      </p:pic>
+          <p:cNvSpPr>
+            <a:spLocks noGrp="1"/>
+          </p:cNvSpPr>
+          <p:nvPr>
+            <p:ph type="body" idx="1"/>
+          </p:nvPr>
+        </p:nvSpPr>
+        <p:spPr/>
+        <p:txBody>
+          <a:bodyPr/>
+          <a:lstStyle/>
+          <a:p>
+            <a:r>
+              <a:rPr lang="en-US" dirty="0"/>
+              <a:t>The SVM loss function will find the “best” separating hyperplane overall, but perhaps we could draw a better hyperplane to separate just </a:t>
+            </a:r>
+            <a:r>
+              <a:rPr lang="en-US" i="1" dirty="0"/>
+              <a:t>k</a:t>
+            </a:r>
+            <a:r>
+              <a:rPr lang="en-US" dirty="0"/>
+              <a:t> positive examples?</a:t>
+            </a:r>
+            <a:br>
+              <a:rPr lang="en-US" dirty="0"/>
+            </a:br>
+            <a:endParaRPr lang="en-US" dirty="0"/>
+          </a:p>
+          <a:p>
+            <a:r>
+              <a:rPr lang="en-US" i="1" dirty="0" err="1"/>
+              <a:t>Transductive</a:t>
+            </a:r>
+            <a:r>
+              <a:rPr lang="en-US" dirty="0"/>
+              <a:t> method: needs to be aware of the test set </a:t>
+            </a:r>
+            <a:r>
+              <a:rPr lang="en-US" b="1" dirty="0"/>
+              <a:t>without labels</a:t>
+            </a:r>
+            <a:r>
+              <a:rPr lang="en-US" dirty="0"/>
+              <a:t> to select just </a:t>
+            </a:r>
+            <a:r>
+              <a:rPr lang="en-US" i="1" dirty="0"/>
+              <a:t>k</a:t>
+            </a:r>
+            <a:r>
+              <a:rPr lang="en-US" dirty="0"/>
+              <a:t> test examples.</a:t>
+            </a:r>
+            <a:br>
+              <a:rPr lang="en-US" dirty="0"/>
+            </a:br>
+            <a:endParaRPr lang="en-US" dirty="0"/>
+          </a:p>
+          <a:p>
+            <a:r>
+              <a:rPr lang="en-US" dirty="0"/>
+              <a:t>Modified gradient descent procedure to project gradient direction for L2-regularized SVM loss onto a “feasible solution cone” such that </a:t>
+            </a:r>
+            <a:r>
+              <a:rPr lang="en-US" u="sng" dirty="0"/>
+              <a:t>no more than</a:t>
+            </a:r>
+            <a:r>
+              <a:rPr lang="en-US" dirty="0"/>
+              <a:t> </a:t>
+            </a:r>
+            <a:r>
+              <a:rPr lang="en-US" i="1" dirty="0"/>
+              <a:t>k</a:t>
+            </a:r>
+            <a:r>
+              <a:rPr lang="en-US" dirty="0"/>
+              <a:t> test examples will be predicted positive after the step.</a:t>
+            </a:r>
+          </a:p>
+        </p:txBody>
+      </p:sp>
     </p:spTree>
     <p:extLst>
       <p:ext uri="{BB962C8B-B14F-4D97-AF65-F5344CB8AC3E}">
-        <p14:creationId xmlns:p14="http://schemas.microsoft.com/office/powerpoint/2010/main" val="1478637945"/>
+        <p14:creationId xmlns:p14="http://schemas.microsoft.com/office/powerpoint/2010/main" val="94907443"/>
       </p:ext>
     </p:extLst>
   </p:cSld>
@@ -19153,102 +19255,40 @@
           </a:p>
         </p:txBody>
       </p:sp>
-      <p:sp>
-        <p:nvSpPr>
-          <p:cNvPr id="4" name="Text Placeholder 3">
+      <p:pic>
+        <p:nvPicPr>
+          <p:cNvPr id="2" name="Picture 1">
             <a:extLst>
               <a:ext uri="{FF2B5EF4-FFF2-40B4-BE49-F238E27FC236}">
-                <a16:creationId xmlns:a16="http://schemas.microsoft.com/office/drawing/2014/main" id="{5E600BA7-FA45-884F-9820-9E5F2CB7AA48}"/>
+                <a16:creationId xmlns:a16="http://schemas.microsoft.com/office/drawing/2014/main" id="{23F8960D-806C-F441-9A23-1578C38467D8}"/>
               </a:ext>
             </a:extLst>
           </p:cNvPr>
-          <p:cNvSpPr>
-            <a:spLocks noGrp="1"/>
-          </p:cNvSpPr>
-          <p:nvPr>
-            <p:ph type="body" idx="1"/>
-          </p:nvPr>
-        </p:nvSpPr>
-        <p:spPr/>
-        <p:txBody>
-          <a:bodyPr/>
-          <a:lstStyle/>
-          <a:p>
-            <a:r>
-              <a:rPr lang="en-US" dirty="0"/>
-              <a:t>The SVM loss function will find the “best” separating hyperplane overall, but perhaps we could draw a better hyperplane to separate just </a:t>
-            </a:r>
-            <a:r>
-              <a:rPr lang="en-US" i="1" dirty="0"/>
-              <a:t>k</a:t>
-            </a:r>
-            <a:r>
-              <a:rPr lang="en-US" dirty="0"/>
-              <a:t> positive examples?</a:t>
-            </a:r>
-            <a:br>
-              <a:rPr lang="en-US" dirty="0"/>
-            </a:br>
-            <a:endParaRPr lang="en-US" dirty="0"/>
-          </a:p>
-          <a:p>
-            <a:r>
-              <a:rPr lang="en-US" i="1" dirty="0" err="1"/>
-              <a:t>Transductive</a:t>
-            </a:r>
-            <a:r>
-              <a:rPr lang="en-US" dirty="0"/>
-              <a:t> method: needs to be aware of the test set </a:t>
-            </a:r>
-            <a:r>
-              <a:rPr lang="en-US" b="1" dirty="0"/>
-              <a:t>without labels</a:t>
-            </a:r>
-            <a:r>
-              <a:rPr lang="en-US" dirty="0"/>
-              <a:t> to select just </a:t>
-            </a:r>
-            <a:r>
-              <a:rPr lang="en-US" i="1" dirty="0"/>
-              <a:t>k</a:t>
-            </a:r>
-            <a:r>
-              <a:rPr lang="en-US" dirty="0"/>
-              <a:t> test examples.</a:t>
-            </a:r>
-            <a:br>
-              <a:rPr lang="en-US" dirty="0"/>
-            </a:br>
-            <a:endParaRPr lang="en-US" dirty="0"/>
-          </a:p>
-          <a:p>
-            <a:r>
-              <a:rPr lang="en-US" dirty="0"/>
-              <a:t>Modified gradient descent procedure to project gradient direction for L2-regularized SVM loss onto a “feasible solution cone” such that </a:t>
-            </a:r>
-            <a:r>
-              <a:rPr lang="en-US" u="sng" dirty="0"/>
-              <a:t>no more than</a:t>
-            </a:r>
-            <a:r>
-              <a:rPr lang="en-US" dirty="0"/>
-              <a:t> </a:t>
-            </a:r>
-            <a:r>
-              <a:rPr lang="en-US" i="1" dirty="0"/>
-              <a:t>k</a:t>
-            </a:r>
-            <a:r>
-              <a:rPr lang="en-US" dirty="0"/>
-              <a:t> test examples will be predicted positive after the step.</a:t>
-            </a:r>
-          </a:p>
-        </p:txBody>
-      </p:sp>
+          <p:cNvPicPr>
+            <a:picLocks noChangeAspect="1"/>
+          </p:cNvPicPr>
+          <p:nvPr/>
+        </p:nvPicPr>
+        <p:blipFill>
+          <a:blip r:embed="rId2"/>
+          <a:stretch>
+            <a:fillRect/>
+          </a:stretch>
+        </p:blipFill>
+        <p:spPr>
+          <a:xfrm>
+            <a:off x="2749550" y="1371600"/>
+            <a:ext cx="6692900" cy="4114800"/>
+          </a:xfrm>
+          <a:prstGeom prst="rect">
+            <a:avLst/>
+          </a:prstGeom>
+        </p:spPr>
+      </p:pic>
     </p:spTree>
     <p:extLst>
       <p:ext uri="{BB962C8B-B14F-4D97-AF65-F5344CB8AC3E}">
-        <p14:creationId xmlns:p14="http://schemas.microsoft.com/office/powerpoint/2010/main" val="94907443"/>
+        <p14:creationId xmlns:p14="http://schemas.microsoft.com/office/powerpoint/2010/main" val="1715242992"/>
       </p:ext>
     </p:extLst>
   </p:cSld>
@@ -19303,40 +19343,110 @@
           </a:p>
         </p:txBody>
       </p:sp>
-      <p:pic>
-        <p:nvPicPr>
-          <p:cNvPr id="2" name="Picture 1">
+      <p:sp>
+        <p:nvSpPr>
+          <p:cNvPr id="4" name="Text Placeholder 3">
             <a:extLst>
               <a:ext uri="{FF2B5EF4-FFF2-40B4-BE49-F238E27FC236}">
-                <a16:creationId xmlns:a16="http://schemas.microsoft.com/office/drawing/2014/main" id="{23F8960D-806C-F441-9A23-1578C38467D8}"/>
+                <a16:creationId xmlns:a16="http://schemas.microsoft.com/office/drawing/2014/main" id="{5E600BA7-FA45-884F-9820-9E5F2CB7AA48}"/>
               </a:ext>
             </a:extLst>
           </p:cNvPr>
-          <p:cNvPicPr>
-            <a:picLocks noChangeAspect="1"/>
-          </p:cNvPicPr>
-          <p:nvPr/>
-        </p:nvPicPr>
-        <p:blipFill>
-          <a:blip r:embed="rId2"/>
-          <a:stretch>
-            <a:fillRect/>
-          </a:stretch>
-        </p:blipFill>
+          <p:cNvSpPr>
+            <a:spLocks noGrp="1"/>
+          </p:cNvSpPr>
+          <p:nvPr>
+            <p:ph type="body" idx="1"/>
+          </p:nvPr>
+        </p:nvSpPr>
         <p:spPr>
           <a:xfrm>
-            <a:off x="2749550" y="1371600"/>
-            <a:ext cx="6692900" cy="4114800"/>
+            <a:off x="415600" y="1219133"/>
+            <a:ext cx="11360700" cy="5234804"/>
           </a:xfrm>
-          <a:prstGeom prst="rect">
-            <a:avLst/>
-          </a:prstGeom>
         </p:spPr>
-      </p:pic>
+        <p:txBody>
+          <a:bodyPr/>
+          <a:lstStyle/>
+          <a:p>
+            <a:pPr marL="76200" indent="0">
+              <a:buNone/>
+            </a:pPr>
+            <a:r>
+              <a:rPr lang="en-US" dirty="0"/>
+              <a:t>Paper shows improvements on synthetic examples and some “standard” datasets, but still more to investigate:</a:t>
+            </a:r>
+            <a:br>
+              <a:rPr lang="en-US" dirty="0"/>
+            </a:br>
+            <a:endParaRPr lang="en-US" dirty="0"/>
+          </a:p>
+          <a:p>
+            <a:r>
+              <a:rPr lang="en-US" dirty="0"/>
+              <a:t>Can be slow to converge on larger datasets</a:t>
+            </a:r>
+            <a:br>
+              <a:rPr lang="en-US" dirty="0"/>
+            </a:br>
+            <a:endParaRPr lang="en-US" dirty="0"/>
+          </a:p>
+          <a:p>
+            <a:r>
+              <a:rPr lang="en-US" dirty="0"/>
+              <a:t>“At most” </a:t>
+            </a:r>
+            <a:r>
+              <a:rPr lang="en-US" i="1" dirty="0"/>
+              <a:t>k</a:t>
+            </a:r>
+            <a:r>
+              <a:rPr lang="en-US" dirty="0"/>
+              <a:t> examples can yield many fewer than the desired </a:t>
+            </a:r>
+            <a:r>
+              <a:rPr lang="en-US" i="1" dirty="0"/>
+              <a:t>k</a:t>
+            </a:r>
+            <a:r>
+              <a:rPr lang="en-US" dirty="0"/>
+              <a:t>, particularly for rare events (why doesn’t the algorithm target </a:t>
+            </a:r>
+            <a:r>
+              <a:rPr lang="en-US" i="1" dirty="0"/>
+              <a:t>exactly k</a:t>
+            </a:r>
+            <a:r>
+              <a:rPr lang="en-US" dirty="0"/>
+              <a:t>?)</a:t>
+            </a:r>
+            <a:br>
+              <a:rPr lang="en-US" dirty="0"/>
+            </a:br>
+            <a:endParaRPr lang="en-US" dirty="0"/>
+          </a:p>
+          <a:p>
+            <a:r>
+              <a:rPr lang="en-US" dirty="0"/>
+              <a:t> Although creating a “top k” boundary, still penalizes false positives and false negatives equally during optimization</a:t>
+            </a:r>
+            <a:br>
+              <a:rPr lang="en-US" dirty="0"/>
+            </a:br>
+            <a:endParaRPr lang="en-US" dirty="0"/>
+          </a:p>
+          <a:p>
+            <a:r>
+              <a:rPr lang="en-US" dirty="0"/>
+              <a:t>Can we do better at the top, even if we don’t have access to the test list?</a:t>
+            </a:r>
+          </a:p>
+        </p:txBody>
+      </p:sp>
     </p:spTree>
     <p:extLst>
       <p:ext uri="{BB962C8B-B14F-4D97-AF65-F5344CB8AC3E}">
-        <p14:creationId xmlns:p14="http://schemas.microsoft.com/office/powerpoint/2010/main" val="1715242992"/>
+        <p14:creationId xmlns:p14="http://schemas.microsoft.com/office/powerpoint/2010/main" val="4118118316"/>
       </p:ext>
     </p:extLst>
   </p:cSld>
@@ -19365,10 +19475,10 @@
       </p:grpSpPr>
       <p:sp>
         <p:nvSpPr>
-          <p:cNvPr id="3" name="Title 2">
+          <p:cNvPr id="2" name="Title 1">
             <a:extLst>
               <a:ext uri="{FF2B5EF4-FFF2-40B4-BE49-F238E27FC236}">
-                <a16:creationId xmlns:a16="http://schemas.microsoft.com/office/drawing/2014/main" id="{9323871C-7CA8-1448-8FFC-1AE6E1838941}"/>
+                <a16:creationId xmlns:a16="http://schemas.microsoft.com/office/drawing/2014/main" id="{A073B702-ED77-884E-88F7-92D73313F38D}"/>
               </a:ext>
             </a:extLst>
           </p:cNvPr>
@@ -19386,17 +19496,17 @@
           <a:p>
             <a:r>
               <a:rPr lang="en-US" dirty="0"/>
-              <a:t>Reminders</a:t>
+              <a:t>Plan for the week</a:t>
             </a:r>
           </a:p>
         </p:txBody>
       </p:sp>
       <p:sp>
         <p:nvSpPr>
-          <p:cNvPr id="5" name="Text Placeholder 4">
+          <p:cNvPr id="3" name="Text Placeholder 2">
             <a:extLst>
               <a:ext uri="{FF2B5EF4-FFF2-40B4-BE49-F238E27FC236}">
-                <a16:creationId xmlns:a16="http://schemas.microsoft.com/office/drawing/2014/main" id="{F4E0A5F0-1D89-954D-91FB-596CD9E690F2}"/>
+                <a16:creationId xmlns:a16="http://schemas.microsoft.com/office/drawing/2014/main" id="{7861BAD4-F7FB-1D48-9D37-2273592A75CE}"/>
               </a:ext>
             </a:extLst>
           </p:cNvPr>
@@ -19412,62 +19522,55 @@
           <a:bodyPr/>
           <a:lstStyle/>
           <a:p>
-            <a:pPr marL="76200" indent="0">
-              <a:buNone/>
-            </a:pPr>
+            <a:r>
+              <a:rPr lang="en-US" dirty="0"/>
+              <a:t>What you should be discussing this week within your team</a:t>
+            </a:r>
+          </a:p>
+          <a:p>
+            <a:pPr lvl="1"/>
+            <a:r>
+              <a:rPr lang="en-US" dirty="0"/>
+              <a:t>Refining pipeline structure and validation splits</a:t>
+            </a:r>
+          </a:p>
+          <a:p>
+            <a:pPr lvl="1"/>
+            <a:r>
+              <a:rPr lang="en-US" dirty="0"/>
+              <a:t>Plans for what you need for initial “</a:t>
+            </a:r>
             <a:r>
               <a:rPr lang="en-US" b="1" dirty="0"/>
-              <a:t>This week:</a:t>
-            </a:r>
+              <a:t>V0</a:t>
+            </a:r>
+            <a:r>
+              <a:rPr lang="en-US" dirty="0"/>
+              <a:t>” results</a:t>
+            </a:r>
+          </a:p>
+          <a:p>
+            <a:pPr lvl="1"/>
             <a:endParaRPr lang="en-US" dirty="0"/>
           </a:p>
           <a:p>
             <a:r>
               <a:rPr lang="en-US" dirty="0"/>
-              <a:t>15 minute team check-ins Wed/Thurs (see slack for time slots)</a:t>
-            </a:r>
-          </a:p>
-          <a:p>
-            <a:pPr marL="76200" indent="0">
-              <a:buNone/>
-            </a:pPr>
-            <a:endParaRPr lang="en-US" dirty="0"/>
-          </a:p>
-          <a:p>
-            <a:pPr marL="76200" indent="0">
-              <a:buNone/>
-            </a:pPr>
-            <a:r>
-              <a:rPr lang="en-US" b="1" dirty="0"/>
-              <a:t>Coming up next week:</a:t>
-            </a:r>
-          </a:p>
-          <a:p>
+              <a:t>What you should be building this week</a:t>
+            </a:r>
+          </a:p>
+          <a:p>
+            <a:pPr lvl="1"/>
             <a:r>
               <a:rPr lang="en-US" dirty="0"/>
-              <a:t>Due </a:t>
-            </a:r>
-            <a:r>
-              <a:rPr lang="en-US" b="1" dirty="0"/>
-              <a:t>Monday/Tuesday</a:t>
-            </a:r>
+              <a:t>Pipeline updates based on feedback from update assignments</a:t>
+            </a:r>
+          </a:p>
+          <a:p>
+            <a:pPr lvl="1"/>
             <a:r>
               <a:rPr lang="en-US" dirty="0"/>
-              <a:t>: update assignment (and revisions from last week)</a:t>
-            </a:r>
-            <a:endParaRPr lang="en-US" b="1" dirty="0"/>
-          </a:p>
-          <a:p>
-            <a:r>
-              <a:rPr lang="en-US" dirty="0"/>
-              <a:t>Midterm Project Progress Presentations (Recorded) &amp; Peer Reviews</a:t>
-            </a:r>
-          </a:p>
-          <a:p>
-            <a:pPr lvl="1"/>
-            <a:r>
-              <a:rPr lang="en-US" dirty="0"/>
-              <a:t>We won’t meet next Tuesday to give you time to watch/review your assigned presentations</a:t>
+              <a:t>Preliminary run of minimal models + appropriate baselines</a:t>
             </a:r>
           </a:p>
         </p:txBody>
@@ -19475,7 +19578,7 @@
     </p:spTree>
     <p:extLst>
       <p:ext uri="{BB962C8B-B14F-4D97-AF65-F5344CB8AC3E}">
-        <p14:creationId xmlns:p14="http://schemas.microsoft.com/office/powerpoint/2010/main" val="1533227703"/>
+        <p14:creationId xmlns:p14="http://schemas.microsoft.com/office/powerpoint/2010/main" val="4125266482"/>
       </p:ext>
     </p:extLst>
   </p:cSld>
@@ -19486,164 +19589,6 @@
 </file>
 
 <file path=ppt/slides/slide30.xml><?xml version="1.0" encoding="utf-8"?>
-<p:sld xmlns:a="http://schemas.openxmlformats.org/drawingml/2006/main" xmlns:r="http://schemas.openxmlformats.org/officeDocument/2006/relationships" xmlns:p="http://schemas.openxmlformats.org/presentationml/2006/main">
-  <p:cSld>
-    <p:spTree>
-      <p:nvGrpSpPr>
-        <p:cNvPr id="1" name=""/>
-        <p:cNvGrpSpPr/>
-        <p:nvPr/>
-      </p:nvGrpSpPr>
-      <p:grpSpPr>
-        <a:xfrm>
-          <a:off x="0" y="0"/>
-          <a:ext cx="0" cy="0"/>
-          <a:chOff x="0" y="0"/>
-          <a:chExt cx="0" cy="0"/>
-        </a:xfrm>
-      </p:grpSpPr>
-      <p:sp>
-        <p:nvSpPr>
-          <p:cNvPr id="3" name="Title 2">
-            <a:extLst>
-              <a:ext uri="{FF2B5EF4-FFF2-40B4-BE49-F238E27FC236}">
-                <a16:creationId xmlns:a16="http://schemas.microsoft.com/office/drawing/2014/main" id="{9323871C-7CA8-1448-8FFC-1AE6E1838941}"/>
-              </a:ext>
-            </a:extLst>
-          </p:cNvPr>
-          <p:cNvSpPr>
-            <a:spLocks noGrp="1"/>
-          </p:cNvSpPr>
-          <p:nvPr>
-            <p:ph type="title"/>
-          </p:nvPr>
-        </p:nvSpPr>
-        <p:spPr/>
-        <p:txBody>
-          <a:bodyPr/>
-          <a:lstStyle/>
-          <a:p>
-            <a:r>
-              <a:rPr lang="en-US" dirty="0"/>
-              <a:t>Some Open Research Questions</a:t>
-            </a:r>
-          </a:p>
-        </p:txBody>
-      </p:sp>
-      <p:sp>
-        <p:nvSpPr>
-          <p:cNvPr id="4" name="Text Placeholder 3">
-            <a:extLst>
-              <a:ext uri="{FF2B5EF4-FFF2-40B4-BE49-F238E27FC236}">
-                <a16:creationId xmlns:a16="http://schemas.microsoft.com/office/drawing/2014/main" id="{5E600BA7-FA45-884F-9820-9E5F2CB7AA48}"/>
-              </a:ext>
-            </a:extLst>
-          </p:cNvPr>
-          <p:cNvSpPr>
-            <a:spLocks noGrp="1"/>
-          </p:cNvSpPr>
-          <p:nvPr>
-            <p:ph type="body" idx="1"/>
-          </p:nvPr>
-        </p:nvSpPr>
-        <p:spPr>
-          <a:xfrm>
-            <a:off x="415600" y="1219133"/>
-            <a:ext cx="11360700" cy="5234804"/>
-          </a:xfrm>
-        </p:spPr>
-        <p:txBody>
-          <a:bodyPr/>
-          <a:lstStyle/>
-          <a:p>
-            <a:pPr marL="76200" indent="0">
-              <a:buNone/>
-            </a:pPr>
-            <a:r>
-              <a:rPr lang="en-US" dirty="0"/>
-              <a:t>Paper shows improvements on synthetic examples and some “standard” datasets, but still more to investigate:</a:t>
-            </a:r>
-            <a:br>
-              <a:rPr lang="en-US" dirty="0"/>
-            </a:br>
-            <a:endParaRPr lang="en-US" dirty="0"/>
-          </a:p>
-          <a:p>
-            <a:r>
-              <a:rPr lang="en-US" dirty="0"/>
-              <a:t>Can be slow to converge on larger datasets</a:t>
-            </a:r>
-            <a:br>
-              <a:rPr lang="en-US" dirty="0"/>
-            </a:br>
-            <a:endParaRPr lang="en-US" dirty="0"/>
-          </a:p>
-          <a:p>
-            <a:r>
-              <a:rPr lang="en-US" dirty="0"/>
-              <a:t>“At most” </a:t>
-            </a:r>
-            <a:r>
-              <a:rPr lang="en-US" i="1" dirty="0"/>
-              <a:t>k</a:t>
-            </a:r>
-            <a:r>
-              <a:rPr lang="en-US" dirty="0"/>
-              <a:t> examples can yield many fewer than the desired </a:t>
-            </a:r>
-            <a:r>
-              <a:rPr lang="en-US" i="1" dirty="0"/>
-              <a:t>k</a:t>
-            </a:r>
-            <a:r>
-              <a:rPr lang="en-US" dirty="0"/>
-              <a:t>, particularly for rare events (why doesn’t the algorithm target </a:t>
-            </a:r>
-            <a:r>
-              <a:rPr lang="en-US" i="1" dirty="0"/>
-              <a:t>exactly k</a:t>
-            </a:r>
-            <a:r>
-              <a:rPr lang="en-US" dirty="0"/>
-              <a:t>?)</a:t>
-            </a:r>
-            <a:br>
-              <a:rPr lang="en-US" dirty="0"/>
-            </a:br>
-            <a:endParaRPr lang="en-US" dirty="0"/>
-          </a:p>
-          <a:p>
-            <a:r>
-              <a:rPr lang="en-US" dirty="0"/>
-              <a:t> Although creating a “top k” boundary, still penalizes false positives and false negatives equally during optimization</a:t>
-            </a:r>
-            <a:br>
-              <a:rPr lang="en-US" dirty="0"/>
-            </a:br>
-            <a:endParaRPr lang="en-US" dirty="0"/>
-          </a:p>
-          <a:p>
-            <a:r>
-              <a:rPr lang="en-US" dirty="0"/>
-              <a:t>Can we do better at the top, even if we don’t have access to the test list?</a:t>
-            </a:r>
-          </a:p>
-        </p:txBody>
-      </p:sp>
-    </p:spTree>
-    <p:extLst>
-      <p:ext uri="{BB962C8B-B14F-4D97-AF65-F5344CB8AC3E}">
-        <p14:creationId xmlns:p14="http://schemas.microsoft.com/office/powerpoint/2010/main" val="4118118316"/>
-      </p:ext>
-    </p:extLst>
-  </p:cSld>
-  <p:clrMapOvr>
-    <a:masterClrMapping/>
-  </p:clrMapOvr>
-</p:sld>
-</file>
-
-<file path=ppt/slides/slide31.xml><?xml version="1.0" encoding="utf-8"?>
 <p:sld xmlns:a="http://schemas.openxmlformats.org/drawingml/2006/main" xmlns:r="http://schemas.openxmlformats.org/officeDocument/2006/relationships" xmlns:p="http://schemas.openxmlformats.org/presentationml/2006/main">
   <p:cSld>
     <p:spTree>
@@ -19709,7 +19654,7 @@
 </p:sld>
 </file>
 
-<file path=ppt/slides/slide32.xml><?xml version="1.0" encoding="utf-8"?>
+<file path=ppt/slides/slide31.xml><?xml version="1.0" encoding="utf-8"?>
 <p:sld xmlns:a="http://schemas.openxmlformats.org/drawingml/2006/main" xmlns:r="http://schemas.openxmlformats.org/officeDocument/2006/relationships" xmlns:p="http://schemas.openxmlformats.org/presentationml/2006/main">
   <p:cSld>
     <p:spTree>
@@ -20551,7 +20496,7 @@
 </p:sld>
 </file>
 
-<file path=ppt/slides/slide33.xml><?xml version="1.0" encoding="utf-8"?>
+<file path=ppt/slides/slide32.xml><?xml version="1.0" encoding="utf-8"?>
 <p:sld xmlns:a="http://schemas.openxmlformats.org/drawingml/2006/main" xmlns:r="http://schemas.openxmlformats.org/officeDocument/2006/relationships" xmlns:p="http://schemas.openxmlformats.org/presentationml/2006/main">
   <p:cSld>
     <p:spTree>
@@ -20675,6 +20620,594 @@
     <p:extLst>
       <p:ext uri="{BB962C8B-B14F-4D97-AF65-F5344CB8AC3E}">
         <p14:creationId xmlns:p14="http://schemas.microsoft.com/office/powerpoint/2010/main" val="462557737"/>
+      </p:ext>
+    </p:extLst>
+  </p:cSld>
+  <p:clrMapOvr>
+    <a:masterClrMapping/>
+  </p:clrMapOvr>
+</p:sld>
+</file>
+
+<file path=ppt/slides/slide33.xml><?xml version="1.0" encoding="utf-8"?>
+<p:sld xmlns:a="http://schemas.openxmlformats.org/drawingml/2006/main" xmlns:r="http://schemas.openxmlformats.org/officeDocument/2006/relationships" xmlns:p="http://schemas.openxmlformats.org/presentationml/2006/main">
+  <p:cSld>
+    <p:spTree>
+      <p:nvGrpSpPr>
+        <p:cNvPr id="1" name="Shape 93"/>
+        <p:cNvGrpSpPr/>
+        <p:nvPr/>
+      </p:nvGrpSpPr>
+      <p:grpSpPr>
+        <a:xfrm>
+          <a:off x="0" y="0"/>
+          <a:ext cx="0" cy="0"/>
+          <a:chOff x="0" y="0"/>
+          <a:chExt cx="0" cy="0"/>
+        </a:xfrm>
+      </p:grpSpPr>
+      <p:sp>
+        <p:nvSpPr>
+          <p:cNvPr id="94" name="Google Shape;94;p5"/>
+          <p:cNvSpPr txBox="1"/>
+          <p:nvPr/>
+        </p:nvSpPr>
+        <p:spPr>
+          <a:xfrm>
+            <a:off x="1981200" y="5624513"/>
+            <a:ext cx="2133600" cy="273900"/>
+          </a:xfrm>
+          <a:prstGeom prst="rect">
+            <a:avLst/>
+          </a:prstGeom>
+          <a:noFill/>
+          <a:ln>
+            <a:noFill/>
+          </a:ln>
+        </p:spPr>
+        <p:txBody>
+          <a:bodyPr spcFirstLastPara="1" wrap="square" lIns="91425" tIns="91425" rIns="91425" bIns="91425" anchor="ctr" anchorCtr="0">
+            <a:noAutofit/>
+          </a:bodyPr>
+          <a:lstStyle/>
+          <a:p>
+            <a:pPr marL="0" marR="0" lvl="0" indent="0" algn="l" rtl="0">
+              <a:spcBef>
+                <a:spcPts val="0"/>
+              </a:spcBef>
+              <a:spcAft>
+                <a:spcPts val="0"/>
+              </a:spcAft>
+              <a:buNone/>
+            </a:pPr>
+            <a:endParaRPr sz="2400" b="0" i="0" u="none" strike="noStrike" cap="none">
+              <a:solidFill>
+                <a:srgbClr val="000000"/>
+              </a:solidFill>
+              <a:latin typeface="Calibri"/>
+              <a:ea typeface="Calibri"/>
+              <a:cs typeface="Calibri"/>
+              <a:sym typeface="Calibri"/>
+            </a:endParaRPr>
+          </a:p>
+        </p:txBody>
+      </p:sp>
+      <p:sp>
+        <p:nvSpPr>
+          <p:cNvPr id="95" name="Google Shape;95;p5"/>
+          <p:cNvSpPr txBox="1"/>
+          <p:nvPr/>
+        </p:nvSpPr>
+        <p:spPr>
+          <a:xfrm>
+            <a:off x="4648200" y="5624513"/>
+            <a:ext cx="2895600" cy="273900"/>
+          </a:xfrm>
+          <a:prstGeom prst="rect">
+            <a:avLst/>
+          </a:prstGeom>
+          <a:noFill/>
+          <a:ln>
+            <a:noFill/>
+          </a:ln>
+        </p:spPr>
+        <p:txBody>
+          <a:bodyPr spcFirstLastPara="1" wrap="square" lIns="91425" tIns="91425" rIns="91425" bIns="91425" anchor="ctr" anchorCtr="0">
+            <a:noAutofit/>
+          </a:bodyPr>
+          <a:lstStyle/>
+          <a:p>
+            <a:pPr marL="0" marR="0" lvl="0" indent="0" algn="ctr" rtl="0">
+              <a:spcBef>
+                <a:spcPts val="0"/>
+              </a:spcBef>
+              <a:spcAft>
+                <a:spcPts val="0"/>
+              </a:spcAft>
+              <a:buNone/>
+            </a:pPr>
+            <a:endParaRPr sz="2400" b="0" i="0" u="none" strike="noStrike" cap="none">
+              <a:solidFill>
+                <a:srgbClr val="000000"/>
+              </a:solidFill>
+              <a:latin typeface="Calibri"/>
+              <a:ea typeface="Calibri"/>
+              <a:cs typeface="Calibri"/>
+              <a:sym typeface="Calibri"/>
+            </a:endParaRPr>
+          </a:p>
+        </p:txBody>
+      </p:sp>
+      <p:sp>
+        <p:nvSpPr>
+          <p:cNvPr id="96" name="Google Shape;96;p5"/>
+          <p:cNvSpPr txBox="1"/>
+          <p:nvPr/>
+        </p:nvSpPr>
+        <p:spPr>
+          <a:xfrm>
+            <a:off x="8077200" y="5624513"/>
+            <a:ext cx="2133600" cy="273900"/>
+          </a:xfrm>
+          <a:prstGeom prst="rect">
+            <a:avLst/>
+          </a:prstGeom>
+          <a:noFill/>
+          <a:ln>
+            <a:noFill/>
+          </a:ln>
+        </p:spPr>
+        <p:txBody>
+          <a:bodyPr spcFirstLastPara="1" wrap="square" lIns="91425" tIns="45700" rIns="91425" bIns="45700" anchor="ctr" anchorCtr="0">
+            <a:noAutofit/>
+          </a:bodyPr>
+          <a:lstStyle/>
+          <a:p>
+            <a:pPr marL="0" marR="0" lvl="0" indent="0" algn="r" rtl="0">
+              <a:spcBef>
+                <a:spcPts val="0"/>
+              </a:spcBef>
+              <a:spcAft>
+                <a:spcPts val="0"/>
+              </a:spcAft>
+              <a:buNone/>
+            </a:pPr>
+            <a:fld id="{00000000-1234-1234-1234-123412341234}" type="slidenum">
+              <a:rPr lang="en-US" sz="1200" b="0" i="0" u="none" strike="noStrike" cap="none">
+                <a:solidFill>
+                  <a:srgbClr val="888888"/>
+                </a:solidFill>
+                <a:latin typeface="Calibri"/>
+                <a:ea typeface="Calibri"/>
+                <a:cs typeface="Calibri"/>
+                <a:sym typeface="Calibri"/>
+              </a:rPr>
+              <a:t>33</a:t>
+            </a:fld>
+            <a:endParaRPr sz="1200" b="0" i="0" u="none" strike="noStrike" cap="none">
+              <a:solidFill>
+                <a:srgbClr val="888888"/>
+              </a:solidFill>
+              <a:latin typeface="Calibri"/>
+              <a:ea typeface="Calibri"/>
+              <a:cs typeface="Calibri"/>
+              <a:sym typeface="Calibri"/>
+            </a:endParaRPr>
+          </a:p>
+        </p:txBody>
+      </p:sp>
+      <p:sp>
+        <p:nvSpPr>
+          <p:cNvPr id="97" name="Google Shape;97;p5"/>
+          <p:cNvSpPr txBox="1"/>
+          <p:nvPr/>
+        </p:nvSpPr>
+        <p:spPr>
+          <a:xfrm>
+            <a:off x="1526024" y="5700726"/>
+            <a:ext cx="9144000" cy="273900"/>
+          </a:xfrm>
+          <a:prstGeom prst="rect">
+            <a:avLst/>
+          </a:prstGeom>
+          <a:noFill/>
+          <a:ln>
+            <a:noFill/>
+          </a:ln>
+        </p:spPr>
+        <p:txBody>
+          <a:bodyPr spcFirstLastPara="1" wrap="square" lIns="91425" tIns="45700" rIns="91425" bIns="45700" anchor="ctr" anchorCtr="0">
+            <a:noAutofit/>
+          </a:bodyPr>
+          <a:lstStyle/>
+          <a:p>
+            <a:pPr marL="0" marR="0" lvl="0" indent="0" algn="ctr" rtl="0">
+              <a:spcBef>
+                <a:spcPts val="0"/>
+              </a:spcBef>
+              <a:spcAft>
+                <a:spcPts val="0"/>
+              </a:spcAft>
+              <a:buNone/>
+            </a:pPr>
+            <a:r>
+              <a:rPr lang="en-US" sz="1200" b="0" i="0" u="none" strike="noStrike" cap="none">
+                <a:solidFill>
+                  <a:srgbClr val="FFFFFF"/>
+                </a:solidFill>
+                <a:latin typeface="Calibri"/>
+                <a:ea typeface="Calibri"/>
+                <a:cs typeface="Calibri"/>
+                <a:sym typeface="Calibri"/>
+              </a:rPr>
+              <a:t>Center for Data Science and Public Policy</a:t>
+            </a:r>
+            <a:br>
+              <a:rPr lang="en-US" sz="1200" b="0" i="0" u="none" strike="noStrike" cap="none">
+                <a:solidFill>
+                  <a:srgbClr val="FFFFFF"/>
+                </a:solidFill>
+                <a:latin typeface="Calibri"/>
+                <a:ea typeface="Calibri"/>
+                <a:cs typeface="Calibri"/>
+                <a:sym typeface="Calibri"/>
+              </a:rPr>
+            </a:br>
+            <a:r>
+              <a:rPr lang="en-US" sz="1200" b="0" i="0" u="none" strike="noStrike" cap="none">
+                <a:solidFill>
+                  <a:srgbClr val="FFFFFF"/>
+                </a:solidFill>
+                <a:latin typeface="Calibri"/>
+                <a:ea typeface="Calibri"/>
+                <a:cs typeface="Calibri"/>
+                <a:sym typeface="Calibri"/>
+              </a:rPr>
+              <a:t>University of Chicago</a:t>
+            </a:r>
+            <a:endParaRPr/>
+          </a:p>
+          <a:p>
+            <a:pPr marL="0" marR="0" lvl="0" indent="0" algn="ctr" rtl="0">
+              <a:spcBef>
+                <a:spcPts val="0"/>
+              </a:spcBef>
+              <a:spcAft>
+                <a:spcPts val="0"/>
+              </a:spcAft>
+              <a:buNone/>
+            </a:pPr>
+            <a:endParaRPr sz="1200" b="0" i="0" u="none" strike="noStrike" cap="none">
+              <a:solidFill>
+                <a:srgbClr val="FFFFFF"/>
+              </a:solidFill>
+              <a:latin typeface="Calibri"/>
+              <a:ea typeface="Calibri"/>
+              <a:cs typeface="Calibri"/>
+              <a:sym typeface="Calibri"/>
+            </a:endParaRPr>
+          </a:p>
+        </p:txBody>
+      </p:sp>
+      <p:sp>
+        <p:nvSpPr>
+          <p:cNvPr id="98" name="Google Shape;98;p5"/>
+          <p:cNvSpPr txBox="1"/>
+          <p:nvPr/>
+        </p:nvSpPr>
+        <p:spPr>
+          <a:xfrm>
+            <a:off x="1739600" y="5624526"/>
+            <a:ext cx="1592400" cy="273900"/>
+          </a:xfrm>
+          <a:prstGeom prst="rect">
+            <a:avLst/>
+          </a:prstGeom>
+          <a:noFill/>
+          <a:ln>
+            <a:noFill/>
+          </a:ln>
+        </p:spPr>
+        <p:txBody>
+          <a:bodyPr spcFirstLastPara="1" wrap="square" lIns="91425" tIns="45700" rIns="91425" bIns="45700" anchor="ctr" anchorCtr="0">
+            <a:noAutofit/>
+          </a:bodyPr>
+          <a:lstStyle/>
+          <a:p>
+            <a:pPr marL="0" marR="0" lvl="0" indent="0" algn="l" rtl="0">
+              <a:spcBef>
+                <a:spcPts val="0"/>
+              </a:spcBef>
+              <a:spcAft>
+                <a:spcPts val="0"/>
+              </a:spcAft>
+              <a:buNone/>
+            </a:pPr>
+            <a:r>
+              <a:rPr lang="en-US" sz="1200" b="0" i="0" u="none" strike="noStrike" cap="none">
+                <a:solidFill>
+                  <a:srgbClr val="FFFFFF"/>
+                </a:solidFill>
+                <a:latin typeface="Calibri"/>
+                <a:ea typeface="Calibri"/>
+                <a:cs typeface="Calibri"/>
+                <a:sym typeface="Calibri"/>
+              </a:rPr>
+              <a:t>dsapp.uchicago.edu</a:t>
+            </a:r>
+            <a:endParaRPr/>
+          </a:p>
+        </p:txBody>
+      </p:sp>
+      <p:sp>
+        <p:nvSpPr>
+          <p:cNvPr id="99" name="Google Shape;99;p5"/>
+          <p:cNvSpPr txBox="1"/>
+          <p:nvPr/>
+        </p:nvSpPr>
+        <p:spPr>
+          <a:xfrm>
+            <a:off x="8906233" y="5624513"/>
+            <a:ext cx="1304700" cy="273900"/>
+          </a:xfrm>
+          <a:prstGeom prst="rect">
+            <a:avLst/>
+          </a:prstGeom>
+          <a:noFill/>
+          <a:ln>
+            <a:noFill/>
+          </a:ln>
+        </p:spPr>
+        <p:txBody>
+          <a:bodyPr spcFirstLastPara="1" wrap="square" lIns="91425" tIns="45700" rIns="91425" bIns="45700" anchor="ctr" anchorCtr="0">
+            <a:noAutofit/>
+          </a:bodyPr>
+          <a:lstStyle/>
+          <a:p>
+            <a:pPr marL="0" marR="0" lvl="0" indent="0" algn="r" rtl="0">
+              <a:spcBef>
+                <a:spcPts val="0"/>
+              </a:spcBef>
+              <a:spcAft>
+                <a:spcPts val="0"/>
+              </a:spcAft>
+              <a:buNone/>
+            </a:pPr>
+            <a:r>
+              <a:rPr lang="en-US" sz="1200" b="0" i="0" u="none" strike="noStrike" cap="none">
+                <a:solidFill>
+                  <a:srgbClr val="FFFFFF"/>
+                </a:solidFill>
+                <a:latin typeface="Calibri"/>
+                <a:ea typeface="Calibri"/>
+                <a:cs typeface="Calibri"/>
+                <a:sym typeface="Calibri"/>
+              </a:rPr>
+              <a:t>@datascifellows</a:t>
+            </a:r>
+            <a:endParaRPr/>
+          </a:p>
+        </p:txBody>
+      </p:sp>
+      <p:sp>
+        <p:nvSpPr>
+          <p:cNvPr id="100" name="Google Shape;100;p5"/>
+          <p:cNvSpPr txBox="1">
+            <a:spLocks noGrp="1"/>
+          </p:cNvSpPr>
+          <p:nvPr>
+            <p:ph type="body" idx="1"/>
+          </p:nvPr>
+        </p:nvSpPr>
+        <p:spPr>
+          <a:xfrm>
+            <a:off x="415600" y="1536625"/>
+            <a:ext cx="8421900" cy="5060700"/>
+          </a:xfrm>
+          <a:prstGeom prst="rect">
+            <a:avLst/>
+          </a:prstGeom>
+          <a:noFill/>
+          <a:ln>
+            <a:noFill/>
+          </a:ln>
+        </p:spPr>
+        <p:txBody>
+          <a:bodyPr spcFirstLastPara="1" wrap="square" lIns="91425" tIns="91425" rIns="91425" bIns="91425" anchor="t" anchorCtr="0">
+            <a:noAutofit/>
+          </a:bodyPr>
+          <a:lstStyle/>
+          <a:p>
+            <a:pPr marL="457189" lvl="0" indent="-228594" algn="l" rtl="0">
+              <a:spcBef>
+                <a:spcPts val="0"/>
+              </a:spcBef>
+              <a:spcAft>
+                <a:spcPts val="0"/>
+              </a:spcAft>
+              <a:buClr>
+                <a:schemeClr val="dk1"/>
+              </a:buClr>
+              <a:buSzPts val="2800"/>
+              <a:buAutoNum type="arabicPeriod"/>
+            </a:pPr>
+            <a:r>
+              <a:rPr lang="en-US" sz="2800" b="1" dirty="0"/>
+              <a:t> Goals</a:t>
+            </a:r>
+            <a:r>
+              <a:rPr lang="en-US" sz="2800" dirty="0"/>
+              <a:t>: Define the goal(s) of the project</a:t>
+            </a:r>
+            <a:br>
+              <a:rPr lang="en-US" sz="2800" dirty="0"/>
+            </a:br>
+            <a:endParaRPr sz="1200" dirty="0"/>
+          </a:p>
+          <a:p>
+            <a:pPr marL="457189" lvl="0" indent="-228594" algn="l" rtl="0">
+              <a:spcBef>
+                <a:spcPts val="560"/>
+              </a:spcBef>
+              <a:spcAft>
+                <a:spcPts val="0"/>
+              </a:spcAft>
+              <a:buClr>
+                <a:schemeClr val="dk1"/>
+              </a:buClr>
+              <a:buSzPts val="2800"/>
+              <a:buAutoNum type="arabicPeriod"/>
+            </a:pPr>
+            <a:r>
+              <a:rPr lang="en-US" sz="2800" b="1" dirty="0"/>
+              <a:t> Actions</a:t>
+            </a:r>
+            <a:r>
+              <a:rPr lang="en-US" sz="2800" dirty="0"/>
+              <a:t>: What actions/interventions will you inform?</a:t>
+            </a:r>
+            <a:br>
+              <a:rPr lang="en-US" sz="2800" dirty="0"/>
+            </a:br>
+            <a:endParaRPr sz="1200" dirty="0"/>
+          </a:p>
+          <a:p>
+            <a:pPr marL="457189" lvl="0" indent="-228594" algn="l" rtl="0">
+              <a:spcBef>
+                <a:spcPts val="560"/>
+              </a:spcBef>
+              <a:spcAft>
+                <a:spcPts val="0"/>
+              </a:spcAft>
+              <a:buClr>
+                <a:schemeClr val="dk1"/>
+              </a:buClr>
+              <a:buSzPts val="2800"/>
+              <a:buAutoNum type="arabicPeriod"/>
+            </a:pPr>
+            <a:r>
+              <a:rPr lang="en-US" sz="2800" b="1" dirty="0"/>
+              <a:t> Data</a:t>
+            </a:r>
+            <a:r>
+              <a:rPr lang="en-US" sz="2800" dirty="0"/>
+              <a:t>: What data do you have internally? What data do you need? What can you augment from external and public sources?</a:t>
+            </a:r>
+            <a:br>
+              <a:rPr lang="en-US" sz="2800" dirty="0"/>
+            </a:br>
+            <a:endParaRPr sz="1200" dirty="0"/>
+          </a:p>
+          <a:p>
+            <a:pPr marL="457189" lvl="0" indent="-228594" algn="l" rtl="0">
+              <a:spcBef>
+                <a:spcPts val="560"/>
+              </a:spcBef>
+              <a:spcAft>
+                <a:spcPts val="0"/>
+              </a:spcAft>
+              <a:buClr>
+                <a:schemeClr val="dk1"/>
+              </a:buClr>
+              <a:buSzPts val="2800"/>
+              <a:buAutoNum type="arabicPeriod"/>
+            </a:pPr>
+            <a:r>
+              <a:rPr lang="en-US" sz="2800" b="1" dirty="0"/>
+              <a:t> Analysis</a:t>
+            </a:r>
+            <a:r>
+              <a:rPr lang="en-US" sz="2800" dirty="0"/>
+              <a:t>: What analysis needs to be done? </a:t>
+            </a:r>
+            <a:br>
+              <a:rPr lang="en-US" sz="2800" dirty="0"/>
+            </a:br>
+            <a:r>
+              <a:rPr lang="en-US" sz="2800" dirty="0"/>
+              <a:t>How will it be validated?</a:t>
+            </a:r>
+            <a:endParaRPr dirty="0"/>
+          </a:p>
+        </p:txBody>
+      </p:sp>
+      <p:sp>
+        <p:nvSpPr>
+          <p:cNvPr id="101" name="Google Shape;101;p5"/>
+          <p:cNvSpPr txBox="1">
+            <a:spLocks noGrp="1"/>
+          </p:cNvSpPr>
+          <p:nvPr>
+            <p:ph type="title"/>
+          </p:nvPr>
+        </p:nvSpPr>
+        <p:spPr>
+          <a:xfrm>
+            <a:off x="415600" y="-1"/>
+            <a:ext cx="11360700" cy="973449"/>
+          </a:xfrm>
+          <a:prstGeom prst="rect">
+            <a:avLst/>
+          </a:prstGeom>
+          <a:noFill/>
+          <a:ln>
+            <a:noFill/>
+          </a:ln>
+        </p:spPr>
+        <p:txBody>
+          <a:bodyPr spcFirstLastPara="1" wrap="square" lIns="91425" tIns="91425" rIns="91425" bIns="91425" anchor="ctr" anchorCtr="0">
+            <a:noAutofit/>
+          </a:bodyPr>
+          <a:lstStyle/>
+          <a:p>
+            <a:pPr marL="0" lvl="0" indent="0" algn="ctr" rtl="0">
+              <a:spcBef>
+                <a:spcPts val="0"/>
+              </a:spcBef>
+              <a:spcAft>
+                <a:spcPts val="0"/>
+              </a:spcAft>
+              <a:buNone/>
+            </a:pPr>
+            <a:r>
+              <a:rPr lang="en-US" sz="4600" dirty="0"/>
+              <a:t>Actionable and Goal-Driven Project Scope</a:t>
+            </a:r>
+            <a:endParaRPr sz="4600" dirty="0"/>
+          </a:p>
+        </p:txBody>
+      </p:sp>
+      <p:pic>
+        <p:nvPicPr>
+          <p:cNvPr id="102" name="Google Shape;102;p5"/>
+          <p:cNvPicPr preferRelativeResize="0"/>
+          <p:nvPr/>
+        </p:nvPicPr>
+        <p:blipFill rotWithShape="1">
+          <a:blip r:embed="rId3">
+            <a:alphaModFix/>
+          </a:blip>
+          <a:srcRect/>
+          <a:stretch/>
+        </p:blipFill>
+        <p:spPr>
+          <a:xfrm>
+            <a:off x="8906232" y="1993197"/>
+            <a:ext cx="3068139" cy="3068139"/>
+          </a:xfrm>
+          <a:prstGeom prst="rect">
+            <a:avLst/>
+          </a:prstGeom>
+          <a:noFill/>
+          <a:ln>
+            <a:noFill/>
+          </a:ln>
+        </p:spPr>
+      </p:pic>
+    </p:spTree>
+    <p:extLst>
+      <p:ext uri="{BB962C8B-B14F-4D97-AF65-F5344CB8AC3E}">
+        <p14:creationId xmlns:p14="http://schemas.microsoft.com/office/powerpoint/2010/main" val="2436022473"/>
       </p:ext>
     </p:extLst>
   </p:cSld>
@@ -21046,594 +21579,6 @@
       </p:sp>
       <p:sp>
         <p:nvSpPr>
-          <p:cNvPr id="100" name="Google Shape;100;p5"/>
-          <p:cNvSpPr txBox="1">
-            <a:spLocks noGrp="1"/>
-          </p:cNvSpPr>
-          <p:nvPr>
-            <p:ph type="body" idx="1"/>
-          </p:nvPr>
-        </p:nvSpPr>
-        <p:spPr>
-          <a:xfrm>
-            <a:off x="415600" y="1536625"/>
-            <a:ext cx="8421900" cy="5060700"/>
-          </a:xfrm>
-          <a:prstGeom prst="rect">
-            <a:avLst/>
-          </a:prstGeom>
-          <a:noFill/>
-          <a:ln>
-            <a:noFill/>
-          </a:ln>
-        </p:spPr>
-        <p:txBody>
-          <a:bodyPr spcFirstLastPara="1" wrap="square" lIns="91425" tIns="91425" rIns="91425" bIns="91425" anchor="t" anchorCtr="0">
-            <a:noAutofit/>
-          </a:bodyPr>
-          <a:lstStyle/>
-          <a:p>
-            <a:pPr marL="457189" lvl="0" indent="-228594" algn="l" rtl="0">
-              <a:spcBef>
-                <a:spcPts val="0"/>
-              </a:spcBef>
-              <a:spcAft>
-                <a:spcPts val="0"/>
-              </a:spcAft>
-              <a:buClr>
-                <a:schemeClr val="dk1"/>
-              </a:buClr>
-              <a:buSzPts val="2800"/>
-              <a:buAutoNum type="arabicPeriod"/>
-            </a:pPr>
-            <a:r>
-              <a:rPr lang="en-US" sz="2800" b="1" dirty="0"/>
-              <a:t> Goals</a:t>
-            </a:r>
-            <a:r>
-              <a:rPr lang="en-US" sz="2800" dirty="0"/>
-              <a:t>: Define the goal(s) of the project</a:t>
-            </a:r>
-            <a:br>
-              <a:rPr lang="en-US" sz="2800" dirty="0"/>
-            </a:br>
-            <a:endParaRPr sz="1200" dirty="0"/>
-          </a:p>
-          <a:p>
-            <a:pPr marL="457189" lvl="0" indent="-228594" algn="l" rtl="0">
-              <a:spcBef>
-                <a:spcPts val="560"/>
-              </a:spcBef>
-              <a:spcAft>
-                <a:spcPts val="0"/>
-              </a:spcAft>
-              <a:buClr>
-                <a:schemeClr val="dk1"/>
-              </a:buClr>
-              <a:buSzPts val="2800"/>
-              <a:buAutoNum type="arabicPeriod"/>
-            </a:pPr>
-            <a:r>
-              <a:rPr lang="en-US" sz="2800" b="1" dirty="0"/>
-              <a:t> Actions</a:t>
-            </a:r>
-            <a:r>
-              <a:rPr lang="en-US" sz="2800" dirty="0"/>
-              <a:t>: What actions/interventions will you inform?</a:t>
-            </a:r>
-            <a:br>
-              <a:rPr lang="en-US" sz="2800" dirty="0"/>
-            </a:br>
-            <a:endParaRPr sz="1200" dirty="0"/>
-          </a:p>
-          <a:p>
-            <a:pPr marL="457189" lvl="0" indent="-228594" algn="l" rtl="0">
-              <a:spcBef>
-                <a:spcPts val="560"/>
-              </a:spcBef>
-              <a:spcAft>
-                <a:spcPts val="0"/>
-              </a:spcAft>
-              <a:buClr>
-                <a:schemeClr val="dk1"/>
-              </a:buClr>
-              <a:buSzPts val="2800"/>
-              <a:buAutoNum type="arabicPeriod"/>
-            </a:pPr>
-            <a:r>
-              <a:rPr lang="en-US" sz="2800" b="1" dirty="0"/>
-              <a:t> Data</a:t>
-            </a:r>
-            <a:r>
-              <a:rPr lang="en-US" sz="2800" dirty="0"/>
-              <a:t>: What data do you have internally? What data do you need? What can you augment from external and public sources?</a:t>
-            </a:r>
-            <a:br>
-              <a:rPr lang="en-US" sz="2800" dirty="0"/>
-            </a:br>
-            <a:endParaRPr sz="1200" dirty="0"/>
-          </a:p>
-          <a:p>
-            <a:pPr marL="457189" lvl="0" indent="-228594" algn="l" rtl="0">
-              <a:spcBef>
-                <a:spcPts val="560"/>
-              </a:spcBef>
-              <a:spcAft>
-                <a:spcPts val="0"/>
-              </a:spcAft>
-              <a:buClr>
-                <a:schemeClr val="dk1"/>
-              </a:buClr>
-              <a:buSzPts val="2800"/>
-              <a:buAutoNum type="arabicPeriod"/>
-            </a:pPr>
-            <a:r>
-              <a:rPr lang="en-US" sz="2800" b="1" dirty="0"/>
-              <a:t> Analysis</a:t>
-            </a:r>
-            <a:r>
-              <a:rPr lang="en-US" sz="2800" dirty="0"/>
-              <a:t>: What analysis needs to be done? </a:t>
-            </a:r>
-            <a:br>
-              <a:rPr lang="en-US" sz="2800" dirty="0"/>
-            </a:br>
-            <a:r>
-              <a:rPr lang="en-US" sz="2800" dirty="0"/>
-              <a:t>How will it be validated?</a:t>
-            </a:r>
-            <a:endParaRPr dirty="0"/>
-          </a:p>
-        </p:txBody>
-      </p:sp>
-      <p:sp>
-        <p:nvSpPr>
-          <p:cNvPr id="101" name="Google Shape;101;p5"/>
-          <p:cNvSpPr txBox="1">
-            <a:spLocks noGrp="1"/>
-          </p:cNvSpPr>
-          <p:nvPr>
-            <p:ph type="title"/>
-          </p:nvPr>
-        </p:nvSpPr>
-        <p:spPr>
-          <a:xfrm>
-            <a:off x="415600" y="-1"/>
-            <a:ext cx="11360700" cy="973449"/>
-          </a:xfrm>
-          <a:prstGeom prst="rect">
-            <a:avLst/>
-          </a:prstGeom>
-          <a:noFill/>
-          <a:ln>
-            <a:noFill/>
-          </a:ln>
-        </p:spPr>
-        <p:txBody>
-          <a:bodyPr spcFirstLastPara="1" wrap="square" lIns="91425" tIns="91425" rIns="91425" bIns="91425" anchor="ctr" anchorCtr="0">
-            <a:noAutofit/>
-          </a:bodyPr>
-          <a:lstStyle/>
-          <a:p>
-            <a:pPr marL="0" lvl="0" indent="0" algn="ctr" rtl="0">
-              <a:spcBef>
-                <a:spcPts val="0"/>
-              </a:spcBef>
-              <a:spcAft>
-                <a:spcPts val="0"/>
-              </a:spcAft>
-              <a:buNone/>
-            </a:pPr>
-            <a:r>
-              <a:rPr lang="en-US" sz="4600" dirty="0"/>
-              <a:t>Actionable and Goal-Driven Project Scope</a:t>
-            </a:r>
-            <a:endParaRPr sz="4600" dirty="0"/>
-          </a:p>
-        </p:txBody>
-      </p:sp>
-      <p:pic>
-        <p:nvPicPr>
-          <p:cNvPr id="102" name="Google Shape;102;p5"/>
-          <p:cNvPicPr preferRelativeResize="0"/>
-          <p:nvPr/>
-        </p:nvPicPr>
-        <p:blipFill rotWithShape="1">
-          <a:blip r:embed="rId3">
-            <a:alphaModFix/>
-          </a:blip>
-          <a:srcRect/>
-          <a:stretch/>
-        </p:blipFill>
-        <p:spPr>
-          <a:xfrm>
-            <a:off x="8906232" y="1993197"/>
-            <a:ext cx="3068139" cy="3068139"/>
-          </a:xfrm>
-          <a:prstGeom prst="rect">
-            <a:avLst/>
-          </a:prstGeom>
-          <a:noFill/>
-          <a:ln>
-            <a:noFill/>
-          </a:ln>
-        </p:spPr>
-      </p:pic>
-    </p:spTree>
-    <p:extLst>
-      <p:ext uri="{BB962C8B-B14F-4D97-AF65-F5344CB8AC3E}">
-        <p14:creationId xmlns:p14="http://schemas.microsoft.com/office/powerpoint/2010/main" val="2436022473"/>
-      </p:ext>
-    </p:extLst>
-  </p:cSld>
-  <p:clrMapOvr>
-    <a:masterClrMapping/>
-  </p:clrMapOvr>
-</p:sld>
-</file>
-
-<file path=ppt/slides/slide35.xml><?xml version="1.0" encoding="utf-8"?>
-<p:sld xmlns:a="http://schemas.openxmlformats.org/drawingml/2006/main" xmlns:r="http://schemas.openxmlformats.org/officeDocument/2006/relationships" xmlns:p="http://schemas.openxmlformats.org/presentationml/2006/main">
-  <p:cSld>
-    <p:spTree>
-      <p:nvGrpSpPr>
-        <p:cNvPr id="1" name="Shape 93"/>
-        <p:cNvGrpSpPr/>
-        <p:nvPr/>
-      </p:nvGrpSpPr>
-      <p:grpSpPr>
-        <a:xfrm>
-          <a:off x="0" y="0"/>
-          <a:ext cx="0" cy="0"/>
-          <a:chOff x="0" y="0"/>
-          <a:chExt cx="0" cy="0"/>
-        </a:xfrm>
-      </p:grpSpPr>
-      <p:sp>
-        <p:nvSpPr>
-          <p:cNvPr id="94" name="Google Shape;94;p5"/>
-          <p:cNvSpPr txBox="1"/>
-          <p:nvPr/>
-        </p:nvSpPr>
-        <p:spPr>
-          <a:xfrm>
-            <a:off x="1981200" y="5624513"/>
-            <a:ext cx="2133600" cy="273900"/>
-          </a:xfrm>
-          <a:prstGeom prst="rect">
-            <a:avLst/>
-          </a:prstGeom>
-          <a:noFill/>
-          <a:ln>
-            <a:noFill/>
-          </a:ln>
-        </p:spPr>
-        <p:txBody>
-          <a:bodyPr spcFirstLastPara="1" wrap="square" lIns="91425" tIns="91425" rIns="91425" bIns="91425" anchor="ctr" anchorCtr="0">
-            <a:noAutofit/>
-          </a:bodyPr>
-          <a:lstStyle/>
-          <a:p>
-            <a:pPr marL="0" marR="0" lvl="0" indent="0" algn="l" rtl="0">
-              <a:spcBef>
-                <a:spcPts val="0"/>
-              </a:spcBef>
-              <a:spcAft>
-                <a:spcPts val="0"/>
-              </a:spcAft>
-              <a:buNone/>
-            </a:pPr>
-            <a:endParaRPr sz="2400" b="0" i="0" u="none" strike="noStrike" cap="none">
-              <a:solidFill>
-                <a:srgbClr val="000000"/>
-              </a:solidFill>
-              <a:latin typeface="Calibri"/>
-              <a:ea typeface="Calibri"/>
-              <a:cs typeface="Calibri"/>
-              <a:sym typeface="Calibri"/>
-            </a:endParaRPr>
-          </a:p>
-        </p:txBody>
-      </p:sp>
-      <p:sp>
-        <p:nvSpPr>
-          <p:cNvPr id="95" name="Google Shape;95;p5"/>
-          <p:cNvSpPr txBox="1"/>
-          <p:nvPr/>
-        </p:nvSpPr>
-        <p:spPr>
-          <a:xfrm>
-            <a:off x="4648200" y="5624513"/>
-            <a:ext cx="2895600" cy="273900"/>
-          </a:xfrm>
-          <a:prstGeom prst="rect">
-            <a:avLst/>
-          </a:prstGeom>
-          <a:noFill/>
-          <a:ln>
-            <a:noFill/>
-          </a:ln>
-        </p:spPr>
-        <p:txBody>
-          <a:bodyPr spcFirstLastPara="1" wrap="square" lIns="91425" tIns="91425" rIns="91425" bIns="91425" anchor="ctr" anchorCtr="0">
-            <a:noAutofit/>
-          </a:bodyPr>
-          <a:lstStyle/>
-          <a:p>
-            <a:pPr marL="0" marR="0" lvl="0" indent="0" algn="ctr" rtl="0">
-              <a:spcBef>
-                <a:spcPts val="0"/>
-              </a:spcBef>
-              <a:spcAft>
-                <a:spcPts val="0"/>
-              </a:spcAft>
-              <a:buNone/>
-            </a:pPr>
-            <a:endParaRPr sz="2400" b="0" i="0" u="none" strike="noStrike" cap="none">
-              <a:solidFill>
-                <a:srgbClr val="000000"/>
-              </a:solidFill>
-              <a:latin typeface="Calibri"/>
-              <a:ea typeface="Calibri"/>
-              <a:cs typeface="Calibri"/>
-              <a:sym typeface="Calibri"/>
-            </a:endParaRPr>
-          </a:p>
-        </p:txBody>
-      </p:sp>
-      <p:sp>
-        <p:nvSpPr>
-          <p:cNvPr id="96" name="Google Shape;96;p5"/>
-          <p:cNvSpPr txBox="1"/>
-          <p:nvPr/>
-        </p:nvSpPr>
-        <p:spPr>
-          <a:xfrm>
-            <a:off x="8077200" y="5624513"/>
-            <a:ext cx="2133600" cy="273900"/>
-          </a:xfrm>
-          <a:prstGeom prst="rect">
-            <a:avLst/>
-          </a:prstGeom>
-          <a:noFill/>
-          <a:ln>
-            <a:noFill/>
-          </a:ln>
-        </p:spPr>
-        <p:txBody>
-          <a:bodyPr spcFirstLastPara="1" wrap="square" lIns="91425" tIns="45700" rIns="91425" bIns="45700" anchor="ctr" anchorCtr="0">
-            <a:noAutofit/>
-          </a:bodyPr>
-          <a:lstStyle/>
-          <a:p>
-            <a:pPr marL="0" marR="0" lvl="0" indent="0" algn="r" rtl="0">
-              <a:spcBef>
-                <a:spcPts val="0"/>
-              </a:spcBef>
-              <a:spcAft>
-                <a:spcPts val="0"/>
-              </a:spcAft>
-              <a:buNone/>
-            </a:pPr>
-            <a:fld id="{00000000-1234-1234-1234-123412341234}" type="slidenum">
-              <a:rPr lang="en-US" sz="1200" b="0" i="0" u="none" strike="noStrike" cap="none">
-                <a:solidFill>
-                  <a:srgbClr val="888888"/>
-                </a:solidFill>
-                <a:latin typeface="Calibri"/>
-                <a:ea typeface="Calibri"/>
-                <a:cs typeface="Calibri"/>
-                <a:sym typeface="Calibri"/>
-              </a:rPr>
-              <a:t>35</a:t>
-            </a:fld>
-            <a:endParaRPr sz="1200" b="0" i="0" u="none" strike="noStrike" cap="none">
-              <a:solidFill>
-                <a:srgbClr val="888888"/>
-              </a:solidFill>
-              <a:latin typeface="Calibri"/>
-              <a:ea typeface="Calibri"/>
-              <a:cs typeface="Calibri"/>
-              <a:sym typeface="Calibri"/>
-            </a:endParaRPr>
-          </a:p>
-        </p:txBody>
-      </p:sp>
-      <p:sp>
-        <p:nvSpPr>
-          <p:cNvPr id="97" name="Google Shape;97;p5"/>
-          <p:cNvSpPr txBox="1"/>
-          <p:nvPr/>
-        </p:nvSpPr>
-        <p:spPr>
-          <a:xfrm>
-            <a:off x="1526024" y="5700726"/>
-            <a:ext cx="9144000" cy="273900"/>
-          </a:xfrm>
-          <a:prstGeom prst="rect">
-            <a:avLst/>
-          </a:prstGeom>
-          <a:noFill/>
-          <a:ln>
-            <a:noFill/>
-          </a:ln>
-        </p:spPr>
-        <p:txBody>
-          <a:bodyPr spcFirstLastPara="1" wrap="square" lIns="91425" tIns="45700" rIns="91425" bIns="45700" anchor="ctr" anchorCtr="0">
-            <a:noAutofit/>
-          </a:bodyPr>
-          <a:lstStyle/>
-          <a:p>
-            <a:pPr marL="0" marR="0" lvl="0" indent="0" algn="ctr" rtl="0">
-              <a:spcBef>
-                <a:spcPts val="0"/>
-              </a:spcBef>
-              <a:spcAft>
-                <a:spcPts val="0"/>
-              </a:spcAft>
-              <a:buNone/>
-            </a:pPr>
-            <a:r>
-              <a:rPr lang="en-US" sz="1200" b="0" i="0" u="none" strike="noStrike" cap="none">
-                <a:solidFill>
-                  <a:srgbClr val="FFFFFF"/>
-                </a:solidFill>
-                <a:latin typeface="Calibri"/>
-                <a:ea typeface="Calibri"/>
-                <a:cs typeface="Calibri"/>
-                <a:sym typeface="Calibri"/>
-              </a:rPr>
-              <a:t>Center for Data Science and Public Policy</a:t>
-            </a:r>
-            <a:br>
-              <a:rPr lang="en-US" sz="1200" b="0" i="0" u="none" strike="noStrike" cap="none">
-                <a:solidFill>
-                  <a:srgbClr val="FFFFFF"/>
-                </a:solidFill>
-                <a:latin typeface="Calibri"/>
-                <a:ea typeface="Calibri"/>
-                <a:cs typeface="Calibri"/>
-                <a:sym typeface="Calibri"/>
-              </a:rPr>
-            </a:br>
-            <a:r>
-              <a:rPr lang="en-US" sz="1200" b="0" i="0" u="none" strike="noStrike" cap="none">
-                <a:solidFill>
-                  <a:srgbClr val="FFFFFF"/>
-                </a:solidFill>
-                <a:latin typeface="Calibri"/>
-                <a:ea typeface="Calibri"/>
-                <a:cs typeface="Calibri"/>
-                <a:sym typeface="Calibri"/>
-              </a:rPr>
-              <a:t>University of Chicago</a:t>
-            </a:r>
-            <a:endParaRPr/>
-          </a:p>
-          <a:p>
-            <a:pPr marL="0" marR="0" lvl="0" indent="0" algn="ctr" rtl="0">
-              <a:spcBef>
-                <a:spcPts val="0"/>
-              </a:spcBef>
-              <a:spcAft>
-                <a:spcPts val="0"/>
-              </a:spcAft>
-              <a:buNone/>
-            </a:pPr>
-            <a:endParaRPr sz="1200" b="0" i="0" u="none" strike="noStrike" cap="none">
-              <a:solidFill>
-                <a:srgbClr val="FFFFFF"/>
-              </a:solidFill>
-              <a:latin typeface="Calibri"/>
-              <a:ea typeface="Calibri"/>
-              <a:cs typeface="Calibri"/>
-              <a:sym typeface="Calibri"/>
-            </a:endParaRPr>
-          </a:p>
-        </p:txBody>
-      </p:sp>
-      <p:sp>
-        <p:nvSpPr>
-          <p:cNvPr id="98" name="Google Shape;98;p5"/>
-          <p:cNvSpPr txBox="1"/>
-          <p:nvPr/>
-        </p:nvSpPr>
-        <p:spPr>
-          <a:xfrm>
-            <a:off x="1739600" y="5624526"/>
-            <a:ext cx="1592400" cy="273900"/>
-          </a:xfrm>
-          <a:prstGeom prst="rect">
-            <a:avLst/>
-          </a:prstGeom>
-          <a:noFill/>
-          <a:ln>
-            <a:noFill/>
-          </a:ln>
-        </p:spPr>
-        <p:txBody>
-          <a:bodyPr spcFirstLastPara="1" wrap="square" lIns="91425" tIns="45700" rIns="91425" bIns="45700" anchor="ctr" anchorCtr="0">
-            <a:noAutofit/>
-          </a:bodyPr>
-          <a:lstStyle/>
-          <a:p>
-            <a:pPr marL="0" marR="0" lvl="0" indent="0" algn="l" rtl="0">
-              <a:spcBef>
-                <a:spcPts val="0"/>
-              </a:spcBef>
-              <a:spcAft>
-                <a:spcPts val="0"/>
-              </a:spcAft>
-              <a:buNone/>
-            </a:pPr>
-            <a:r>
-              <a:rPr lang="en-US" sz="1200" b="0" i="0" u="none" strike="noStrike" cap="none">
-                <a:solidFill>
-                  <a:srgbClr val="FFFFFF"/>
-                </a:solidFill>
-                <a:latin typeface="Calibri"/>
-                <a:ea typeface="Calibri"/>
-                <a:cs typeface="Calibri"/>
-                <a:sym typeface="Calibri"/>
-              </a:rPr>
-              <a:t>dsapp.uchicago.edu</a:t>
-            </a:r>
-            <a:endParaRPr/>
-          </a:p>
-        </p:txBody>
-      </p:sp>
-      <p:sp>
-        <p:nvSpPr>
-          <p:cNvPr id="99" name="Google Shape;99;p5"/>
-          <p:cNvSpPr txBox="1"/>
-          <p:nvPr/>
-        </p:nvSpPr>
-        <p:spPr>
-          <a:xfrm>
-            <a:off x="8906233" y="5624513"/>
-            <a:ext cx="1304700" cy="273900"/>
-          </a:xfrm>
-          <a:prstGeom prst="rect">
-            <a:avLst/>
-          </a:prstGeom>
-          <a:noFill/>
-          <a:ln>
-            <a:noFill/>
-          </a:ln>
-        </p:spPr>
-        <p:txBody>
-          <a:bodyPr spcFirstLastPara="1" wrap="square" lIns="91425" tIns="45700" rIns="91425" bIns="45700" anchor="ctr" anchorCtr="0">
-            <a:noAutofit/>
-          </a:bodyPr>
-          <a:lstStyle/>
-          <a:p>
-            <a:pPr marL="0" marR="0" lvl="0" indent="0" algn="r" rtl="0">
-              <a:spcBef>
-                <a:spcPts val="0"/>
-              </a:spcBef>
-              <a:spcAft>
-                <a:spcPts val="0"/>
-              </a:spcAft>
-              <a:buNone/>
-            </a:pPr>
-            <a:r>
-              <a:rPr lang="en-US" sz="1200" b="0" i="0" u="none" strike="noStrike" cap="none">
-                <a:solidFill>
-                  <a:srgbClr val="FFFFFF"/>
-                </a:solidFill>
-                <a:latin typeface="Calibri"/>
-                <a:ea typeface="Calibri"/>
-                <a:cs typeface="Calibri"/>
-                <a:sym typeface="Calibri"/>
-              </a:rPr>
-              <a:t>@datascifellows</a:t>
-            </a:r>
-            <a:endParaRPr/>
-          </a:p>
-        </p:txBody>
-      </p:sp>
-      <p:sp>
-        <p:nvSpPr>
           <p:cNvPr id="101" name="Google Shape;101;p5"/>
           <p:cNvSpPr txBox="1">
             <a:spLocks noGrp="1"/>
@@ -21721,7 +21666,7 @@
 </p:sld>
 </file>
 
-<file path=ppt/slides/slide36.xml><?xml version="1.0" encoding="utf-8"?>
+<file path=ppt/slides/slide35.xml><?xml version="1.0" encoding="utf-8"?>
 <p:sld xmlns:a="http://schemas.openxmlformats.org/drawingml/2006/main" xmlns:r="http://schemas.openxmlformats.org/officeDocument/2006/relationships" xmlns:p="http://schemas.openxmlformats.org/presentationml/2006/main">
   <p:cSld>
     <p:spTree>
@@ -21844,7 +21789,7 @@
 </p:sld>
 </file>
 
-<file path=ppt/slides/slide37.xml><?xml version="1.0" encoding="utf-8"?>
+<file path=ppt/slides/slide36.xml><?xml version="1.0" encoding="utf-8"?>
 <p:sld xmlns:a="http://schemas.openxmlformats.org/drawingml/2006/main" xmlns:r="http://schemas.openxmlformats.org/officeDocument/2006/relationships" xmlns:p="http://schemas.openxmlformats.org/presentationml/2006/main">
   <p:cSld>
     <p:spTree>
@@ -21969,7 +21914,7 @@
 </p:sld>
 </file>
 
-<file path=ppt/slides/slide38.xml><?xml version="1.0" encoding="utf-8"?>
+<file path=ppt/slides/slide37.xml><?xml version="1.0" encoding="utf-8"?>
 <p:sld xmlns:a="http://schemas.openxmlformats.org/drawingml/2006/main" xmlns:r="http://schemas.openxmlformats.org/officeDocument/2006/relationships" xmlns:p="http://schemas.openxmlformats.org/presentationml/2006/main">
   <p:cSld>
     <p:spTree>
@@ -22082,7 +22027,7 @@
 </p:sld>
 </file>
 
-<file path=ppt/slides/slide39.xml><?xml version="1.0" encoding="utf-8"?>
+<file path=ppt/slides/slide38.xml><?xml version="1.0" encoding="utf-8"?>
 <p:sld xmlns:a="http://schemas.openxmlformats.org/drawingml/2006/main" xmlns:r="http://schemas.openxmlformats.org/officeDocument/2006/relationships" xmlns:p="http://schemas.openxmlformats.org/presentationml/2006/main">
   <p:cSld>
     <p:spTree>
@@ -22286,139 +22231,7 @@
 </p:sld>
 </file>
 
-<file path=ppt/slides/slide4.xml><?xml version="1.0" encoding="utf-8"?>
-<p:sld xmlns:a="http://schemas.openxmlformats.org/drawingml/2006/main" xmlns:r="http://schemas.openxmlformats.org/officeDocument/2006/relationships" xmlns:p="http://schemas.openxmlformats.org/presentationml/2006/main">
-  <p:cSld>
-    <p:spTree>
-      <p:nvGrpSpPr>
-        <p:cNvPr id="1" name=""/>
-        <p:cNvGrpSpPr/>
-        <p:nvPr/>
-      </p:nvGrpSpPr>
-      <p:grpSpPr>
-        <a:xfrm>
-          <a:off x="0" y="0"/>
-          <a:ext cx="0" cy="0"/>
-          <a:chOff x="0" y="0"/>
-          <a:chExt cx="0" cy="0"/>
-        </a:xfrm>
-      </p:grpSpPr>
-      <p:sp>
-        <p:nvSpPr>
-          <p:cNvPr id="2" name="Title 1">
-            <a:extLst>
-              <a:ext uri="{FF2B5EF4-FFF2-40B4-BE49-F238E27FC236}">
-                <a16:creationId xmlns:a16="http://schemas.microsoft.com/office/drawing/2014/main" id="{A073B702-ED77-884E-88F7-92D73313F38D}"/>
-              </a:ext>
-            </a:extLst>
-          </p:cNvPr>
-          <p:cNvSpPr>
-            <a:spLocks noGrp="1"/>
-          </p:cNvSpPr>
-          <p:nvPr>
-            <p:ph type="title"/>
-          </p:nvPr>
-        </p:nvSpPr>
-        <p:spPr/>
-        <p:txBody>
-          <a:bodyPr/>
-          <a:lstStyle/>
-          <a:p>
-            <a:r>
-              <a:rPr lang="en-US" dirty="0"/>
-              <a:t>Plan for the week</a:t>
-            </a:r>
-          </a:p>
-        </p:txBody>
-      </p:sp>
-      <p:sp>
-        <p:nvSpPr>
-          <p:cNvPr id="3" name="Text Placeholder 2">
-            <a:extLst>
-              <a:ext uri="{FF2B5EF4-FFF2-40B4-BE49-F238E27FC236}">
-                <a16:creationId xmlns:a16="http://schemas.microsoft.com/office/drawing/2014/main" id="{7861BAD4-F7FB-1D48-9D37-2273592A75CE}"/>
-              </a:ext>
-            </a:extLst>
-          </p:cNvPr>
-          <p:cNvSpPr>
-            <a:spLocks noGrp="1"/>
-          </p:cNvSpPr>
-          <p:nvPr>
-            <p:ph type="body" idx="1"/>
-          </p:nvPr>
-        </p:nvSpPr>
-        <p:spPr/>
-        <p:txBody>
-          <a:bodyPr/>
-          <a:lstStyle/>
-          <a:p>
-            <a:r>
-              <a:rPr lang="en-US" dirty="0"/>
-              <a:t>What you should be discussing this week within your team</a:t>
-            </a:r>
-          </a:p>
-          <a:p>
-            <a:pPr lvl="1"/>
-            <a:r>
-              <a:rPr lang="en-US" dirty="0"/>
-              <a:t>Refining pipeline structure and validation splits</a:t>
-            </a:r>
-          </a:p>
-          <a:p>
-            <a:pPr lvl="1"/>
-            <a:r>
-              <a:rPr lang="en-US" dirty="0"/>
-              <a:t>Plans for what you need for initial “</a:t>
-            </a:r>
-            <a:r>
-              <a:rPr lang="en-US" b="1" dirty="0"/>
-              <a:t>V0</a:t>
-            </a:r>
-            <a:r>
-              <a:rPr lang="en-US" dirty="0"/>
-              <a:t>” results</a:t>
-            </a:r>
-          </a:p>
-          <a:p>
-            <a:pPr lvl="1"/>
-            <a:endParaRPr lang="en-US" dirty="0"/>
-          </a:p>
-          <a:p>
-            <a:r>
-              <a:rPr lang="en-US" dirty="0"/>
-              <a:t>What you should be building this week</a:t>
-            </a:r>
-          </a:p>
-          <a:p>
-            <a:pPr lvl="1"/>
-            <a:r>
-              <a:rPr lang="en-US" dirty="0"/>
-              <a:t>Pipeline updates based on feedback from update assignments</a:t>
-            </a:r>
-          </a:p>
-          <a:p>
-            <a:pPr lvl="1"/>
-            <a:r>
-              <a:rPr lang="en-US" dirty="0"/>
-              <a:t>Preliminary run of minimal models + appropriate baselines</a:t>
-            </a:r>
-          </a:p>
-        </p:txBody>
-      </p:sp>
-    </p:spTree>
-    <p:extLst>
-      <p:ext uri="{BB962C8B-B14F-4D97-AF65-F5344CB8AC3E}">
-        <p14:creationId xmlns:p14="http://schemas.microsoft.com/office/powerpoint/2010/main" val="4125266482"/>
-      </p:ext>
-    </p:extLst>
-  </p:cSld>
-  <p:clrMapOvr>
-    <a:masterClrMapping/>
-  </p:clrMapOvr>
-</p:sld>
-</file>
-
-<file path=ppt/slides/slide40.xml><?xml version="1.0" encoding="utf-8"?>
+<file path=ppt/slides/slide39.xml><?xml version="1.0" encoding="utf-8"?>
 <p:sld xmlns:a="http://schemas.openxmlformats.org/drawingml/2006/main" xmlns:r="http://schemas.openxmlformats.org/officeDocument/2006/relationships" xmlns:p="http://schemas.openxmlformats.org/presentationml/2006/main">
   <p:cSld>
     <p:spTree>
@@ -23009,7 +22822,136 @@
 </p:sld>
 </file>
 
-<file path=ppt/slides/slide41.xml><?xml version="1.0" encoding="utf-8"?>
+<file path=ppt/slides/slide4.xml><?xml version="1.0" encoding="utf-8"?>
+<p:sld xmlns:a="http://schemas.openxmlformats.org/drawingml/2006/main" xmlns:r="http://schemas.openxmlformats.org/officeDocument/2006/relationships" xmlns:p="http://schemas.openxmlformats.org/presentationml/2006/main">
+  <p:cSld>
+    <p:spTree>
+      <p:nvGrpSpPr>
+        <p:cNvPr id="1" name=""/>
+        <p:cNvGrpSpPr/>
+        <p:nvPr/>
+      </p:nvGrpSpPr>
+      <p:grpSpPr>
+        <a:xfrm>
+          <a:off x="0" y="0"/>
+          <a:ext cx="0" cy="0"/>
+          <a:chOff x="0" y="0"/>
+          <a:chExt cx="0" cy="0"/>
+        </a:xfrm>
+      </p:grpSpPr>
+      <p:sp>
+        <p:nvSpPr>
+          <p:cNvPr id="2" name="Title 1">
+            <a:extLst>
+              <a:ext uri="{FF2B5EF4-FFF2-40B4-BE49-F238E27FC236}">
+                <a16:creationId xmlns:a16="http://schemas.microsoft.com/office/drawing/2014/main" id="{94CF2A94-A63F-6149-AA28-2E35B60E3D3E}"/>
+              </a:ext>
+            </a:extLst>
+          </p:cNvPr>
+          <p:cNvSpPr>
+            <a:spLocks noGrp="1"/>
+          </p:cNvSpPr>
+          <p:nvPr>
+            <p:ph type="title"/>
+          </p:nvPr>
+        </p:nvSpPr>
+        <p:spPr/>
+        <p:txBody>
+          <a:bodyPr/>
+          <a:lstStyle/>
+          <a:p>
+            <a:endParaRPr lang="en-US"/>
+          </a:p>
+        </p:txBody>
+      </p:sp>
+      <p:graphicFrame>
+        <p:nvGraphicFramePr>
+          <p:cNvPr id="3" name="Diagram 2">
+            <a:extLst>
+              <a:ext uri="{FF2B5EF4-FFF2-40B4-BE49-F238E27FC236}">
+                <a16:creationId xmlns:a16="http://schemas.microsoft.com/office/drawing/2014/main" id="{8E902576-68A9-6E48-B0FE-5B1889953DC8}"/>
+              </a:ext>
+            </a:extLst>
+          </p:cNvPr>
+          <p:cNvGraphicFramePr/>
+          <p:nvPr/>
+        </p:nvGraphicFramePr>
+        <p:xfrm>
+          <a:off x="180467" y="0"/>
+          <a:ext cx="11776400" cy="6858000"/>
+        </p:xfrm>
+        <a:graphic>
+          <a:graphicData uri="http://schemas.openxmlformats.org/drawingml/2006/diagram">
+            <dgm:relIds xmlns:dgm="http://schemas.openxmlformats.org/drawingml/2006/diagram" xmlns:r="http://schemas.openxmlformats.org/officeDocument/2006/relationships" r:dm="rId2" r:lo="rId3" r:qs="rId4" r:cs="rId5"/>
+          </a:graphicData>
+        </a:graphic>
+      </p:graphicFrame>
+      <p:sp>
+        <p:nvSpPr>
+          <p:cNvPr id="4" name="Rectangle 3">
+            <a:extLst>
+              <a:ext uri="{FF2B5EF4-FFF2-40B4-BE49-F238E27FC236}">
+                <a16:creationId xmlns:a16="http://schemas.microsoft.com/office/drawing/2014/main" id="{E2C99BF2-C81A-5246-89D3-E49BCDCAD699}"/>
+              </a:ext>
+            </a:extLst>
+          </p:cNvPr>
+          <p:cNvSpPr/>
+          <p:nvPr/>
+        </p:nvSpPr>
+        <p:spPr>
+          <a:xfrm>
+            <a:off x="9553197" y="2534144"/>
+            <a:ext cx="2534195" cy="1789611"/>
+          </a:xfrm>
+          <a:prstGeom prst="rect">
+            <a:avLst/>
+          </a:prstGeom>
+          <a:noFill/>
+          <a:ln w="76200">
+            <a:solidFill>
+              <a:srgbClr val="C00000"/>
+            </a:solidFill>
+          </a:ln>
+        </p:spPr>
+        <p:style>
+          <a:lnRef idx="2">
+            <a:schemeClr val="accent1">
+              <a:shade val="50000"/>
+            </a:schemeClr>
+          </a:lnRef>
+          <a:fillRef idx="1">
+            <a:schemeClr val="accent1"/>
+          </a:fillRef>
+          <a:effectRef idx="0">
+            <a:schemeClr val="accent1"/>
+          </a:effectRef>
+          <a:fontRef idx="minor">
+            <a:schemeClr val="lt1"/>
+          </a:fontRef>
+        </p:style>
+        <p:txBody>
+          <a:bodyPr rtlCol="0" anchor="ctr"/>
+          <a:lstStyle/>
+          <a:p>
+            <a:pPr algn="ctr"/>
+            <a:endParaRPr lang="en-US"/>
+          </a:p>
+        </p:txBody>
+      </p:sp>
+    </p:spTree>
+    <p:extLst>
+      <p:ext uri="{BB962C8B-B14F-4D97-AF65-F5344CB8AC3E}">
+        <p14:creationId xmlns:p14="http://schemas.microsoft.com/office/powerpoint/2010/main" val="3423844277"/>
+      </p:ext>
+    </p:extLst>
+  </p:cSld>
+  <p:clrMapOvr>
+    <a:masterClrMapping/>
+  </p:clrMapOvr>
+</p:sld>
+</file>
+
+<file path=ppt/slides/slide40.xml><?xml version="1.0" encoding="utf-8"?>
 <p:sld xmlns:a="http://schemas.openxmlformats.org/drawingml/2006/main" xmlns:r="http://schemas.openxmlformats.org/officeDocument/2006/relationships" xmlns:p="http://schemas.openxmlformats.org/presentationml/2006/main">
   <p:cSld>
     <p:spTree>
@@ -23172,7 +23114,7 @@
 </p:sld>
 </file>
 
-<file path=ppt/slides/slide42.xml><?xml version="1.0" encoding="utf-8"?>
+<file path=ppt/slides/slide41.xml><?xml version="1.0" encoding="utf-8"?>
 <p:sld xmlns:a="http://schemas.openxmlformats.org/drawingml/2006/main" xmlns:r="http://schemas.openxmlformats.org/officeDocument/2006/relationships" xmlns:p="http://schemas.openxmlformats.org/presentationml/2006/main">
   <p:cSld>
     <p:spTree>
@@ -24585,7 +24527,7 @@
 </p:sld>
 </file>
 
-<file path=ppt/slides/slide43.xml><?xml version="1.0" encoding="utf-8"?>
+<file path=ppt/slides/slide42.xml><?xml version="1.0" encoding="utf-8"?>
 <p:sld xmlns:a="http://schemas.openxmlformats.org/drawingml/2006/main" xmlns:r="http://schemas.openxmlformats.org/officeDocument/2006/relationships" xmlns:p="http://schemas.openxmlformats.org/presentationml/2006/main">
   <p:cSld>
     <p:spTree>
@@ -25406,7 +25348,7 @@
 </p:sld>
 </file>
 
-<file path=ppt/slides/slide44.xml><?xml version="1.0" encoding="utf-8"?>
+<file path=ppt/slides/slide43.xml><?xml version="1.0" encoding="utf-8"?>
 <p:sld xmlns:a="http://schemas.openxmlformats.org/drawingml/2006/main" xmlns:r="http://schemas.openxmlformats.org/officeDocument/2006/relationships" xmlns:p="http://schemas.openxmlformats.org/presentationml/2006/main" show="0">
   <p:cSld>
     <p:spTree>
@@ -25495,7 +25437,7 @@
 </p:sld>
 </file>
 
-<file path=ppt/slides/slide45.xml><?xml version="1.0" encoding="utf-8"?>
+<file path=ppt/slides/slide44.xml><?xml version="1.0" encoding="utf-8"?>
 <p:sld xmlns:a="http://schemas.openxmlformats.org/drawingml/2006/main" xmlns:r="http://schemas.openxmlformats.org/officeDocument/2006/relationships" xmlns:p="http://schemas.openxmlformats.org/presentationml/2006/main">
   <p:cSld>
     <p:spTree>
@@ -25653,13 +25595,7 @@
       </p:grpSpPr>
       <p:sp>
         <p:nvSpPr>
-          <p:cNvPr id="2" name="Title 1">
-            <a:extLst>
-              <a:ext uri="{FF2B5EF4-FFF2-40B4-BE49-F238E27FC236}">
-                <a16:creationId xmlns:a16="http://schemas.microsoft.com/office/drawing/2014/main" id="{94CF2A94-A63F-6149-AA28-2E35B60E3D3E}"/>
-              </a:ext>
-            </a:extLst>
-          </p:cNvPr>
+          <p:cNvPr id="3" name="Title 2"/>
           <p:cNvSpPr>
             <a:spLocks noGrp="1"/>
           </p:cNvSpPr>
@@ -25672,88 +25608,65 @@
           <a:bodyPr/>
           <a:lstStyle/>
           <a:p>
-            <a:endParaRPr lang="en-US"/>
+            <a:r>
+              <a:rPr lang="en-US" dirty="0"/>
+              <a:t>Why do we need to do model selection?</a:t>
+            </a:r>
           </a:p>
         </p:txBody>
       </p:sp>
-      <p:graphicFrame>
-        <p:nvGraphicFramePr>
-          <p:cNvPr id="3" name="Diagram 2">
-            <a:extLst>
-              <a:ext uri="{FF2B5EF4-FFF2-40B4-BE49-F238E27FC236}">
-                <a16:creationId xmlns:a16="http://schemas.microsoft.com/office/drawing/2014/main" id="{8E902576-68A9-6E48-B0FE-5B1889953DC8}"/>
-              </a:ext>
-            </a:extLst>
-          </p:cNvPr>
-          <p:cNvGraphicFramePr/>
-          <p:nvPr/>
-        </p:nvGraphicFramePr>
-        <p:xfrm>
-          <a:off x="180467" y="0"/>
-          <a:ext cx="11776400" cy="6858000"/>
-        </p:xfrm>
-        <a:graphic>
-          <a:graphicData uri="http://schemas.openxmlformats.org/drawingml/2006/diagram">
-            <dgm:relIds xmlns:dgm="http://schemas.openxmlformats.org/drawingml/2006/diagram" xmlns:r="http://schemas.openxmlformats.org/officeDocument/2006/relationships" r:dm="rId2" r:lo="rId3" r:qs="rId4" r:cs="rId5"/>
-          </a:graphicData>
-        </a:graphic>
-      </p:graphicFrame>
       <p:sp>
         <p:nvSpPr>
-          <p:cNvPr id="4" name="Rectangle 3">
-            <a:extLst>
-              <a:ext uri="{FF2B5EF4-FFF2-40B4-BE49-F238E27FC236}">
-                <a16:creationId xmlns:a16="http://schemas.microsoft.com/office/drawing/2014/main" id="{E2C99BF2-C81A-5246-89D3-E49BCDCAD699}"/>
-              </a:ext>
-            </a:extLst>
-          </p:cNvPr>
-          <p:cNvSpPr/>
-          <p:nvPr/>
+          <p:cNvPr id="2" name="Content Placeholder 1"/>
+          <p:cNvSpPr>
+            <a:spLocks noGrp="1"/>
+          </p:cNvSpPr>
+          <p:nvPr>
+            <p:ph type="body" idx="1"/>
+          </p:nvPr>
         </p:nvSpPr>
-        <p:spPr>
-          <a:xfrm>
-            <a:off x="9553197" y="2534144"/>
-            <a:ext cx="2534195" cy="1789611"/>
-          </a:xfrm>
-          <a:prstGeom prst="rect">
-            <a:avLst/>
-          </a:prstGeom>
-          <a:noFill/>
-          <a:ln w="76200">
-            <a:solidFill>
-              <a:srgbClr val="C00000"/>
-            </a:solidFill>
-          </a:ln>
-        </p:spPr>
-        <p:style>
-          <a:lnRef idx="2">
-            <a:schemeClr val="accent1">
-              <a:shade val="50000"/>
-            </a:schemeClr>
-          </a:lnRef>
-          <a:fillRef idx="1">
-            <a:schemeClr val="accent1"/>
-          </a:fillRef>
-          <a:effectRef idx="0">
-            <a:schemeClr val="accent1"/>
-          </a:effectRef>
-          <a:fontRef idx="minor">
-            <a:schemeClr val="lt1"/>
-          </a:fontRef>
-        </p:style>
+        <p:spPr/>
         <p:txBody>
-          <a:bodyPr rtlCol="0" anchor="ctr"/>
+          <a:bodyPr/>
           <a:lstStyle/>
           <a:p>
-            <a:pPr algn="ctr"/>
-            <a:endParaRPr lang="en-US"/>
+            <a:r>
+              <a:rPr lang="en-US" sz="2800" dirty="0"/>
+              <a:t>You’ve run a large number of different types of models varying …</a:t>
+            </a:r>
+          </a:p>
+          <a:p>
+            <a:endParaRPr lang="en-US" sz="2800" dirty="0"/>
+          </a:p>
+          <a:p>
+            <a:r>
+              <a:rPr lang="en-US" sz="2800" dirty="0"/>
+              <a:t>You need to understand what types of models are effective under what circumstances, </a:t>
+            </a:r>
+            <a:r>
+              <a:rPr lang="en-US" sz="2800" b="1" dirty="0"/>
+              <a:t>and</a:t>
+            </a:r>
+          </a:p>
+          <a:p>
+            <a:endParaRPr lang="en-US" sz="2800" b="1" dirty="0"/>
+          </a:p>
+          <a:p>
+            <a:r>
+              <a:rPr lang="en-US" sz="2800" dirty="0"/>
+              <a:t>You need to decide which one(s) to use in the </a:t>
+            </a:r>
+            <a:r>
+              <a:rPr lang="en-US" sz="2800" b="1" dirty="0"/>
+              <a:t>future</a:t>
+            </a:r>
           </a:p>
         </p:txBody>
       </p:sp>
     </p:spTree>
     <p:extLst>
       <p:ext uri="{BB962C8B-B14F-4D97-AF65-F5344CB8AC3E}">
-        <p14:creationId xmlns:p14="http://schemas.microsoft.com/office/powerpoint/2010/main" val="3423844277"/>
+        <p14:creationId xmlns:p14="http://schemas.microsoft.com/office/powerpoint/2010/main" val="473448969"/>
       </p:ext>
     </p:extLst>
   </p:cSld>
@@ -25797,7 +25710,7 @@
           <a:p>
             <a:r>
               <a:rPr lang="en-US" dirty="0"/>
-              <a:t>Why do we need to do model selection?</a:t>
+              <a:t>Analyzing the results</a:t>
             </a:r>
           </a:p>
         </p:txBody>
@@ -25818,106 +25731,6 @@
           <a:lstStyle/>
           <a:p>
             <a:r>
-              <a:rPr lang="en-US" sz="2800" dirty="0"/>
-              <a:t>You’ve run a large number of different types of models varying …</a:t>
-            </a:r>
-          </a:p>
-          <a:p>
-            <a:endParaRPr lang="en-US" sz="2800" dirty="0"/>
-          </a:p>
-          <a:p>
-            <a:r>
-              <a:rPr lang="en-US" sz="2800" dirty="0"/>
-              <a:t>You need to understand what types of models are effective under what circumstances, </a:t>
-            </a:r>
-            <a:r>
-              <a:rPr lang="en-US" sz="2800" b="1" dirty="0"/>
-              <a:t>and</a:t>
-            </a:r>
-          </a:p>
-          <a:p>
-            <a:endParaRPr lang="en-US" sz="2800" b="1" dirty="0"/>
-          </a:p>
-          <a:p>
-            <a:r>
-              <a:rPr lang="en-US" sz="2800" dirty="0"/>
-              <a:t>You need to decide which one(s) to use in the </a:t>
-            </a:r>
-            <a:r>
-              <a:rPr lang="en-US" sz="2800" b="1" dirty="0"/>
-              <a:t>future</a:t>
-            </a:r>
-          </a:p>
-        </p:txBody>
-      </p:sp>
-    </p:spTree>
-    <p:extLst>
-      <p:ext uri="{BB962C8B-B14F-4D97-AF65-F5344CB8AC3E}">
-        <p14:creationId xmlns:p14="http://schemas.microsoft.com/office/powerpoint/2010/main" val="473448969"/>
-      </p:ext>
-    </p:extLst>
-  </p:cSld>
-  <p:clrMapOvr>
-    <a:masterClrMapping/>
-  </p:clrMapOvr>
-</p:sld>
-</file>
-
-<file path=ppt/slides/slide7.xml><?xml version="1.0" encoding="utf-8"?>
-<p:sld xmlns:a="http://schemas.openxmlformats.org/drawingml/2006/main" xmlns:r="http://schemas.openxmlformats.org/officeDocument/2006/relationships" xmlns:p="http://schemas.openxmlformats.org/presentationml/2006/main">
-  <p:cSld>
-    <p:spTree>
-      <p:nvGrpSpPr>
-        <p:cNvPr id="1" name=""/>
-        <p:cNvGrpSpPr/>
-        <p:nvPr/>
-      </p:nvGrpSpPr>
-      <p:grpSpPr>
-        <a:xfrm>
-          <a:off x="0" y="0"/>
-          <a:ext cx="0" cy="0"/>
-          <a:chOff x="0" y="0"/>
-          <a:chExt cx="0" cy="0"/>
-        </a:xfrm>
-      </p:grpSpPr>
-      <p:sp>
-        <p:nvSpPr>
-          <p:cNvPr id="3" name="Title 2"/>
-          <p:cNvSpPr>
-            <a:spLocks noGrp="1"/>
-          </p:cNvSpPr>
-          <p:nvPr>
-            <p:ph type="title"/>
-          </p:nvPr>
-        </p:nvSpPr>
-        <p:spPr/>
-        <p:txBody>
-          <a:bodyPr/>
-          <a:lstStyle/>
-          <a:p>
-            <a:r>
-              <a:rPr lang="en-US" dirty="0"/>
-              <a:t>Analyzing the results</a:t>
-            </a:r>
-          </a:p>
-        </p:txBody>
-      </p:sp>
-      <p:sp>
-        <p:nvSpPr>
-          <p:cNvPr id="2" name="Content Placeholder 1"/>
-          <p:cNvSpPr>
-            <a:spLocks noGrp="1"/>
-          </p:cNvSpPr>
-          <p:nvPr>
-            <p:ph type="body" idx="1"/>
-          </p:nvPr>
-        </p:nvSpPr>
-        <p:spPr/>
-        <p:txBody>
-          <a:bodyPr/>
-          <a:lstStyle/>
-          <a:p>
-            <a:r>
               <a:rPr lang="en-US" dirty="0"/>
               <a:t>Which approaches work best?</a:t>
             </a:r>
@@ -25994,7 +25807,7 @@
 </p:sld>
 </file>
 
-<file path=ppt/slides/slide8.xml><?xml version="1.0" encoding="utf-8"?>
+<file path=ppt/slides/slide7.xml><?xml version="1.0" encoding="utf-8"?>
 <p:sld xmlns:a="http://schemas.openxmlformats.org/drawingml/2006/main" xmlns:r="http://schemas.openxmlformats.org/officeDocument/2006/relationships" xmlns:p="http://schemas.openxmlformats.org/presentationml/2006/main">
   <p:cSld>
     <p:spTree>
@@ -26086,7 +25899,7 @@
 </p:sld>
 </file>
 
-<file path=ppt/slides/slide9.xml><?xml version="1.0" encoding="utf-8"?>
+<file path=ppt/slides/slide8.xml><?xml version="1.0" encoding="utf-8"?>
 <p:sld xmlns:a="http://schemas.openxmlformats.org/drawingml/2006/main" xmlns:r="http://schemas.openxmlformats.org/officeDocument/2006/relationships" xmlns:p="http://schemas.openxmlformats.org/presentationml/2006/main">
   <p:cSld>
     <p:spTree>
@@ -26169,6 +25982,98 @@
     <p:extLst>
       <p:ext uri="{BB962C8B-B14F-4D97-AF65-F5344CB8AC3E}">
         <p14:creationId xmlns:p14="http://schemas.microsoft.com/office/powerpoint/2010/main" val="4033446297"/>
+      </p:ext>
+    </p:extLst>
+  </p:cSld>
+  <p:clrMapOvr>
+    <a:masterClrMapping/>
+  </p:clrMapOvr>
+</p:sld>
+</file>
+
+<file path=ppt/slides/slide9.xml><?xml version="1.0" encoding="utf-8"?>
+<p:sld xmlns:a="http://schemas.openxmlformats.org/drawingml/2006/main" xmlns:r="http://schemas.openxmlformats.org/officeDocument/2006/relationships" xmlns:p="http://schemas.openxmlformats.org/presentationml/2006/main">
+  <p:cSld>
+    <p:spTree>
+      <p:nvGrpSpPr>
+        <p:cNvPr id="1" name="Shape 442"/>
+        <p:cNvGrpSpPr/>
+        <p:nvPr/>
+      </p:nvGrpSpPr>
+      <p:grpSpPr>
+        <a:xfrm>
+          <a:off x="0" y="0"/>
+          <a:ext cx="0" cy="0"/>
+          <a:chOff x="0" y="0"/>
+          <a:chExt cx="0" cy="0"/>
+        </a:xfrm>
+      </p:grpSpPr>
+      <p:sp>
+        <p:nvSpPr>
+          <p:cNvPr id="443" name="Google Shape;443;p41"/>
+          <p:cNvSpPr txBox="1">
+            <a:spLocks noGrp="1"/>
+          </p:cNvSpPr>
+          <p:nvPr>
+            <p:ph type="title"/>
+          </p:nvPr>
+        </p:nvSpPr>
+        <p:spPr>
+          <a:prstGeom prst="rect">
+            <a:avLst/>
+          </a:prstGeom>
+        </p:spPr>
+        <p:txBody>
+          <a:bodyPr spcFirstLastPara="1" wrap="square" lIns="121900" tIns="60933" rIns="121900" bIns="60933" anchor="ctr" anchorCtr="0">
+            <a:noAutofit/>
+          </a:bodyPr>
+          <a:lstStyle/>
+          <a:p>
+            <a:r>
+              <a:rPr lang="en" dirty="0"/>
+              <a:t>Model Selection</a:t>
+            </a:r>
+            <a:endParaRPr sz="4000" b="1" dirty="0">
+              <a:latin typeface="Roboto"/>
+              <a:ea typeface="Roboto"/>
+              <a:cs typeface="Roboto"/>
+              <a:sym typeface="Roboto"/>
+            </a:endParaRPr>
+          </a:p>
+        </p:txBody>
+      </p:sp>
+      <p:pic>
+        <p:nvPicPr>
+          <p:cNvPr id="444" name="Google Shape;444;p41" title="Chart"/>
+          <p:cNvPicPr preferRelativeResize="0"/>
+          <p:nvPr/>
+        </p:nvPicPr>
+        <p:blipFill>
+          <a:blip r:embed="rId3">
+            <a:alphaModFix/>
+          </a:blip>
+          <a:stretch>
+            <a:fillRect/>
+          </a:stretch>
+        </p:blipFill>
+        <p:spPr>
+          <a:xfrm>
+            <a:off x="2101685" y="1174400"/>
+            <a:ext cx="7988633" cy="5118800"/>
+          </a:xfrm>
+          <a:prstGeom prst="rect">
+            <a:avLst/>
+          </a:prstGeom>
+          <a:noFill/>
+          <a:ln>
+            <a:noFill/>
+          </a:ln>
+        </p:spPr>
+      </p:pic>
+    </p:spTree>
+    <p:extLst>
+      <p:ext uri="{BB962C8B-B14F-4D97-AF65-F5344CB8AC3E}">
+        <p14:creationId xmlns:p14="http://schemas.microsoft.com/office/powerpoint/2010/main" val="809143300"/>
       </p:ext>
     </p:extLst>
   </p:cSld>

</xml_diff>